<commit_message>
diploma. presentation 5 done
</commit_message>
<xml_diff>
--- a/Semantic Presentation.pptx
+++ b/Semantic Presentation.pptx
@@ -5176,11 +5176,7 @@
             </a:r>
             <a:r>
               <a:rPr lang="en-US" i="1" dirty="0" smtClean="0"/>
-              <a:t>Internationalized Resource </a:t>
-            </a:r>
-            <a:r>
-              <a:rPr lang="en-US" i="1" dirty="0" smtClean="0"/>
-              <a:t>Identifier</a:t>
+              <a:t>Internationalized Resource Identifier</a:t>
             </a:r>
             <a:r>
               <a:rPr lang="en-US" dirty="0" smtClean="0"/>
@@ -5198,11 +5194,7 @@
             </a:r>
             <a:r>
               <a:rPr lang="en-US" i="1" dirty="0" smtClean="0"/>
-              <a:t>Resource Description </a:t>
-            </a:r>
-            <a:r>
-              <a:rPr lang="en-US" i="1" dirty="0" smtClean="0"/>
-              <a:t>Framework</a:t>
+              <a:t>Resource Description Framework</a:t>
             </a:r>
             <a:r>
               <a:rPr lang="en-US" dirty="0" smtClean="0"/>
@@ -5232,11 +5224,19 @@
             </a:r>
             <a:r>
               <a:rPr lang="en-US" i="1" dirty="0" smtClean="0"/>
-              <a:t>Web Ontology </a:t>
+              <a:t>Web Ontology Language</a:t>
             </a:r>
             <a:r>
               <a:rPr lang="en-US" i="1" dirty="0" smtClean="0"/>
-              <a:t>Language)</a:t>
+              <a:t>) – </a:t>
+            </a:r>
+            <a:r>
+              <a:rPr lang="ru-RU" dirty="0" smtClean="0"/>
+              <a:t>используются для описания структуры предметной области в </a:t>
+            </a:r>
+            <a:r>
+              <a:rPr lang="ru-RU" smtClean="0"/>
+              <a:t>семантической паутине.</a:t>
             </a:r>
             <a:endParaRPr lang="ru-RU" dirty="0"/>
           </a:p>

</xml_diff>

<commit_message>
diploma. presentation example done
</commit_message>
<xml_diff>
--- a/Semantic Presentation.pptx
+++ b/Semantic Presentation.pptx
@@ -14,6 +14,7 @@
     <p:sldId id="263" r:id="rId8"/>
     <p:sldId id="264" r:id="rId9"/>
     <p:sldId id="265" r:id="rId10"/>
+    <p:sldId id="266" r:id="rId11"/>
   </p:sldIdLst>
   <p:sldSz cx="9144000" cy="6858000" type="screen4x3"/>
   <p:notesSz cx="6858000" cy="9144000"/>
@@ -259,7 +260,7 @@
             <a:fld id="{7EAF463A-BC7C-46EE-9F1E-7F377CCA4891}" type="datetimeFigureOut">
               <a:rPr lang="en-US" smtClean="0"/>
               <a:pPr/>
-              <a:t>5/28/2015</a:t>
+              <a:t>6/1/2015</a:t>
             </a:fld>
             <a:endParaRPr lang="en-US" dirty="0"/>
           </a:p>
@@ -620,7 +621,7 @@
             <a:fld id="{7EAF463A-BC7C-46EE-9F1E-7F377CCA4891}" type="datetimeFigureOut">
               <a:rPr lang="en-US" smtClean="0"/>
               <a:pPr/>
-              <a:t>5/28/2015</a:t>
+              <a:t>6/1/2015</a:t>
             </a:fld>
             <a:endParaRPr lang="en-US" dirty="0"/>
           </a:p>
@@ -797,7 +798,7 @@
             <a:fld id="{7EAF463A-BC7C-46EE-9F1E-7F377CCA4891}" type="datetimeFigureOut">
               <a:rPr lang="en-US" smtClean="0"/>
               <a:pPr/>
-              <a:t>5/28/2015</a:t>
+              <a:t>6/1/2015</a:t>
             </a:fld>
             <a:endParaRPr lang="en-US" dirty="0"/>
           </a:p>
@@ -1034,7 +1035,7 @@
             <a:fld id="{7EAF463A-BC7C-46EE-9F1E-7F377CCA4891}" type="datetimeFigureOut">
               <a:rPr lang="en-US" smtClean="0"/>
               <a:pPr/>
-              <a:t>5/28/2015</a:t>
+              <a:t>6/1/2015</a:t>
             </a:fld>
             <a:endParaRPr lang="en-US" dirty="0"/>
           </a:p>
@@ -1305,7 +1306,7 @@
             <a:fld id="{7EAF463A-BC7C-46EE-9F1E-7F377CCA4891}" type="datetimeFigureOut">
               <a:rPr lang="en-US" smtClean="0"/>
               <a:pPr/>
-              <a:t>5/28/2015</a:t>
+              <a:t>6/1/2015</a:t>
             </a:fld>
             <a:endParaRPr lang="en-US" dirty="0"/>
           </a:p>
@@ -1527,7 +1528,7 @@
             <a:fld id="{7EAF463A-BC7C-46EE-9F1E-7F377CCA4891}" type="datetimeFigureOut">
               <a:rPr lang="en-US" smtClean="0"/>
               <a:pPr/>
-              <a:t>5/28/2015</a:t>
+              <a:t>6/1/2015</a:t>
             </a:fld>
             <a:endParaRPr lang="en-US" dirty="0"/>
           </a:p>
@@ -1881,7 +1882,7 @@
             <a:fld id="{7EAF463A-BC7C-46EE-9F1E-7F377CCA4891}" type="datetimeFigureOut">
               <a:rPr lang="en-US" smtClean="0"/>
               <a:pPr/>
-              <a:t>5/28/2015</a:t>
+              <a:t>6/1/2015</a:t>
             </a:fld>
             <a:endParaRPr lang="en-US" dirty="0"/>
           </a:p>
@@ -2115,7 +2116,7 @@
             <a:fld id="{7EAF463A-BC7C-46EE-9F1E-7F377CCA4891}" type="datetimeFigureOut">
               <a:rPr lang="en-US" smtClean="0"/>
               <a:pPr/>
-              <a:t>5/28/2015</a:t>
+              <a:t>6/1/2015</a:t>
             </a:fld>
             <a:endParaRPr lang="en-US" dirty="0"/>
           </a:p>
@@ -2257,7 +2258,7 @@
             <a:fld id="{7EAF463A-BC7C-46EE-9F1E-7F377CCA4891}" type="datetimeFigureOut">
               <a:rPr lang="en-US" smtClean="0"/>
               <a:pPr/>
-              <a:t>5/28/2015</a:t>
+              <a:t>6/1/2015</a:t>
             </a:fld>
             <a:endParaRPr lang="en-US" dirty="0"/>
           </a:p>
@@ -2536,7 +2537,7 @@
             <a:fld id="{7EAF463A-BC7C-46EE-9F1E-7F377CCA4891}" type="datetimeFigureOut">
               <a:rPr lang="en-US" smtClean="0"/>
               <a:pPr/>
-              <a:t>5/28/2015</a:t>
+              <a:t>6/1/2015</a:t>
             </a:fld>
             <a:endParaRPr lang="en-US" dirty="0"/>
           </a:p>
@@ -2945,7 +2946,7 @@
             <a:fld id="{7EAF463A-BC7C-46EE-9F1E-7F377CCA4891}" type="datetimeFigureOut">
               <a:rPr lang="en-US" smtClean="0"/>
               <a:pPr/>
-              <a:t>5/28/2015</a:t>
+              <a:t>6/1/2015</a:t>
             </a:fld>
             <a:endParaRPr lang="en-US" dirty="0"/>
           </a:p>
@@ -3285,7 +3286,7 @@
             <a:fld id="{7EAF463A-BC7C-46EE-9F1E-7F377CCA4891}" type="datetimeFigureOut">
               <a:rPr lang="en-US" smtClean="0"/>
               <a:pPr/>
-              <a:t>5/28/2015</a:t>
+              <a:t>6/1/2015</a:t>
             </a:fld>
             <a:endParaRPr lang="en-US" dirty="0"/>
           </a:p>
@@ -3878,6 +3879,110 @@
 </p:sld>
 </file>
 
+<file path=ppt/slides/slide10.xml><?xml version="1.0" encoding="utf-8"?>
+<p:sld xmlns:a="http://schemas.openxmlformats.org/drawingml/2006/main" xmlns:r="http://schemas.openxmlformats.org/officeDocument/2006/relationships" xmlns:p="http://schemas.openxmlformats.org/presentationml/2006/main">
+  <p:cSld>
+    <p:spTree>
+      <p:nvGrpSpPr>
+        <p:cNvPr id="1" name=""/>
+        <p:cNvGrpSpPr/>
+        <p:nvPr/>
+      </p:nvGrpSpPr>
+      <p:grpSpPr>
+        <a:xfrm>
+          <a:off x="0" y="0"/>
+          <a:ext cx="0" cy="0"/>
+          <a:chOff x="0" y="0"/>
+          <a:chExt cx="0" cy="0"/>
+        </a:xfrm>
+      </p:grpSpPr>
+      <p:sp>
+        <p:nvSpPr>
+          <p:cNvPr id="2" name="Заголовок 1"/>
+          <p:cNvSpPr>
+            <a:spLocks noGrp="1"/>
+          </p:cNvSpPr>
+          <p:nvPr>
+            <p:ph type="title"/>
+          </p:nvPr>
+        </p:nvSpPr>
+        <p:spPr/>
+        <p:txBody>
+          <a:bodyPr/>
+          <a:lstStyle/>
+          <a:p>
+            <a:r>
+              <a:rPr lang="ru-RU" dirty="0" smtClean="0"/>
+              <a:t>Рабочая реализация</a:t>
+            </a:r>
+            <a:endParaRPr lang="ru-RU" dirty="0"/>
+          </a:p>
+        </p:txBody>
+      </p:sp>
+      <p:sp>
+        <p:nvSpPr>
+          <p:cNvPr id="3" name="Содержимое 2"/>
+          <p:cNvSpPr>
+            <a:spLocks noGrp="1"/>
+          </p:cNvSpPr>
+          <p:nvPr>
+            <p:ph sz="quarter" idx="1"/>
+          </p:nvPr>
+        </p:nvSpPr>
+        <p:spPr/>
+        <p:txBody>
+          <a:bodyPr/>
+          <a:lstStyle/>
+          <a:p>
+            <a:r>
+              <a:rPr lang="ru-RU" dirty="0" smtClean="0"/>
+              <a:t>В качестве практического примера программного продукта на основе семантической паутины была создано </a:t>
+            </a:r>
+            <a:r>
+              <a:rPr lang="ru-RU" dirty="0" err="1" smtClean="0"/>
+              <a:t>десктопное</a:t>
+            </a:r>
+            <a:r>
+              <a:rPr lang="ru-RU" dirty="0" smtClean="0"/>
+              <a:t> приложение типа </a:t>
+            </a:r>
+            <a:r>
+              <a:rPr lang="en-US" dirty="0" smtClean="0"/>
+              <a:t>Personal Information Manager (</a:t>
+            </a:r>
+            <a:r>
+              <a:rPr lang="ru-RU" dirty="0" smtClean="0"/>
+              <a:t>Персональный Менеджер Ресурсов) названное </a:t>
+            </a:r>
+            <a:r>
+              <a:rPr lang="en-US" dirty="0" smtClean="0"/>
+              <a:t>Semantic Desktop</a:t>
+            </a:r>
+          </a:p>
+          <a:p>
+            <a:r>
+              <a:rPr lang="ru-RU" dirty="0" smtClean="0"/>
+              <a:t>Задача этого приложения – создать семантический граф на основе ресурсов персонального компьютера (пользовательской информации) для облегчения доступа к ним и анализа.</a:t>
+            </a:r>
+            <a:endParaRPr lang="ru-RU" dirty="0"/>
+          </a:p>
+        </p:txBody>
+      </p:sp>
+    </p:spTree>
+  </p:cSld>
+  <p:clrMapOvr>
+    <a:masterClrMapping/>
+  </p:clrMapOvr>
+  <p:timing>
+    <p:tnLst>
+      <p:par>
+        <p:cTn id="1" dur="indefinite" restart="never" nodeType="tmRoot"/>
+      </p:par>
+    </p:tnLst>
+  </p:timing>
+</p:sld>
+</file>
+
 <file path=ppt/slides/slide2.xml><?xml version="1.0" encoding="utf-8"?>
 <p:sld xmlns:a="http://schemas.openxmlformats.org/drawingml/2006/main" xmlns:r="http://schemas.openxmlformats.org/officeDocument/2006/relationships" xmlns:p="http://schemas.openxmlformats.org/presentationml/2006/main">
   <p:cSld>
@@ -5029,23 +5134,7 @@
           <a:p>
             <a:r>
               <a:rPr lang="ru-RU" dirty="0" smtClean="0"/>
-              <a:t>Главная идея семантической паутины – добавление к </a:t>
-            </a:r>
-            <a:r>
-              <a:rPr lang="ru-RU" dirty="0" smtClean="0"/>
-              <a:t>веб-документам</a:t>
-            </a:r>
-            <a:r>
-              <a:rPr lang="ru-RU" dirty="0" smtClean="0"/>
-              <a:t> дополнительной </a:t>
-            </a:r>
-            <a:r>
-              <a:rPr lang="ru-RU" dirty="0" smtClean="0"/>
-              <a:t>мета-информации</a:t>
-            </a:r>
-            <a:r>
-              <a:rPr lang="ru-RU" dirty="0" smtClean="0"/>
-              <a:t>, в виде пригодном для обработке машинами.</a:t>
+              <a:t>Главная идея семантической паутины – добавление к веб-документам дополнительной мета-информации, в виде пригодном для обработке машинами.</a:t>
             </a:r>
           </a:p>
           <a:p>
@@ -5088,6 +5177,13 @@
   <p:clrMapOvr>
     <a:masterClrMapping/>
   </p:clrMapOvr>
+  <p:timing>
+    <p:tnLst>
+      <p:par>
+        <p:cTn id="1" dur="indefinite" restart="never" nodeType="tmRoot"/>
+      </p:par>
+    </p:tnLst>
+  </p:timing>
 </p:sld>
 </file>
 
@@ -5243,6 +5339,13 @@
   <p:clrMapOvr>
     <a:masterClrMapping/>
   </p:clrMapOvr>
+  <p:timing>
+    <p:tnLst>
+      <p:par>
+        <p:cTn id="1" dur="indefinite" restart="never" nodeType="tmRoot"/>
+      </p:par>
+    </p:tnLst>
+  </p:timing>
 </p:sld>
 </file>
 
@@ -5316,6 +5419,13 @@
   <p:clrMapOvr>
     <a:masterClrMapping/>
   </p:clrMapOvr>
+  <p:timing>
+    <p:tnLst>
+      <p:par>
+        <p:cTn id="1" dur="indefinite" restart="never" nodeType="tmRoot"/>
+      </p:par>
+    </p:tnLst>
+  </p:timing>
 </p:sld>
 </file>
 
@@ -5405,6 +5515,13 @@
   <p:clrMapOvr>
     <a:masterClrMapping/>
   </p:clrMapOvr>
+  <p:timing>
+    <p:tnLst>
+      <p:par>
+        <p:cTn id="1" dur="indefinite" restart="never" nodeType="tmRoot"/>
+      </p:par>
+    </p:tnLst>
+  </p:timing>
 </p:sld>
 </file>
 
@@ -5450,28 +5567,1605 @@
       </p:sp>
       <p:sp>
         <p:nvSpPr>
-          <p:cNvPr id="3" name="Содержимое 2"/>
-          <p:cNvSpPr>
-            <a:spLocks noGrp="1"/>
-          </p:cNvSpPr>
-          <p:nvPr>
-            <p:ph sz="quarter" idx="1"/>
-          </p:nvPr>
-        </p:nvSpPr>
-        <p:spPr/>
-        <p:txBody>
-          <a:bodyPr/>
-          <a:lstStyle/>
-          <a:p>
-            <a:endParaRPr lang="ru-RU"/>
-          </a:p>
-        </p:txBody>
-      </p:sp>
+          <p:cNvPr id="4" name="Цилиндр 3"/>
+          <p:cNvSpPr/>
+          <p:nvPr/>
+        </p:nvSpPr>
+        <p:spPr>
+          <a:xfrm>
+            <a:off x="914400" y="1828800"/>
+            <a:ext cx="1600200" cy="1524000"/>
+          </a:xfrm>
+          <a:prstGeom prst="can">
+            <a:avLst>
+              <a:gd name="adj" fmla="val 19949"/>
+            </a:avLst>
+          </a:prstGeom>
+        </p:spPr>
+        <p:style>
+          <a:lnRef idx="2">
+            <a:schemeClr val="accent1">
+              <a:shade val="50000"/>
+            </a:schemeClr>
+          </a:lnRef>
+          <a:fillRef idx="1">
+            <a:schemeClr val="accent1"/>
+          </a:fillRef>
+          <a:effectRef idx="0">
+            <a:schemeClr val="accent1"/>
+          </a:effectRef>
+          <a:fontRef idx="minor">
+            <a:schemeClr val="lt1"/>
+          </a:fontRef>
+        </p:style>
+        <p:txBody>
+          <a:bodyPr rtlCol="0" anchor="ctr"/>
+          <a:lstStyle/>
+          <a:p>
+            <a:pPr algn="ctr"/>
+            <a:r>
+              <a:rPr lang="ru-RU" dirty="0" smtClean="0"/>
+              <a:t>База</a:t>
+            </a:r>
+          </a:p>
+          <a:p>
+            <a:pPr algn="ctr"/>
+            <a:r>
+              <a:rPr lang="ru-RU" dirty="0" smtClean="0"/>
+              <a:t>Данных</a:t>
+            </a:r>
+          </a:p>
+          <a:p>
+            <a:pPr algn="ctr"/>
+            <a:r>
+              <a:rPr lang="ru-RU" dirty="0" smtClean="0"/>
+              <a:t>№1</a:t>
+            </a:r>
+            <a:endParaRPr lang="ru-RU" dirty="0"/>
+          </a:p>
+        </p:txBody>
+      </p:sp>
+      <p:sp>
+        <p:nvSpPr>
+          <p:cNvPr id="5" name="Цилиндр 4"/>
+          <p:cNvSpPr/>
+          <p:nvPr/>
+        </p:nvSpPr>
+        <p:spPr>
+          <a:xfrm>
+            <a:off x="6629400" y="1905000"/>
+            <a:ext cx="1600200" cy="1447800"/>
+          </a:xfrm>
+          <a:prstGeom prst="can">
+            <a:avLst>
+              <a:gd name="adj" fmla="val 20455"/>
+            </a:avLst>
+          </a:prstGeom>
+        </p:spPr>
+        <p:style>
+          <a:lnRef idx="2">
+            <a:schemeClr val="accent1">
+              <a:shade val="50000"/>
+            </a:schemeClr>
+          </a:lnRef>
+          <a:fillRef idx="1">
+            <a:schemeClr val="accent1"/>
+          </a:fillRef>
+          <a:effectRef idx="0">
+            <a:schemeClr val="accent1"/>
+          </a:effectRef>
+          <a:fontRef idx="minor">
+            <a:schemeClr val="lt1"/>
+          </a:fontRef>
+        </p:style>
+        <p:txBody>
+          <a:bodyPr rtlCol="0" anchor="ctr"/>
+          <a:lstStyle/>
+          <a:p>
+            <a:pPr algn="ctr"/>
+            <a:r>
+              <a:rPr lang="ru-RU" dirty="0" smtClean="0"/>
+              <a:t>База</a:t>
+            </a:r>
+          </a:p>
+          <a:p>
+            <a:pPr algn="ctr"/>
+            <a:r>
+              <a:rPr lang="ru-RU" dirty="0" smtClean="0"/>
+              <a:t>Данных</a:t>
+            </a:r>
+          </a:p>
+          <a:p>
+            <a:pPr algn="ctr"/>
+            <a:r>
+              <a:rPr lang="ru-RU" dirty="0" smtClean="0"/>
+              <a:t>№2</a:t>
+            </a:r>
+            <a:endParaRPr lang="ru-RU" dirty="0"/>
+          </a:p>
+        </p:txBody>
+      </p:sp>
+      <p:grpSp>
+        <p:nvGrpSpPr>
+          <p:cNvPr id="77" name="Группа 76"/>
+          <p:cNvGrpSpPr/>
+          <p:nvPr/>
+        </p:nvGrpSpPr>
+        <p:grpSpPr>
+          <a:xfrm>
+            <a:off x="2590800" y="1676400"/>
+            <a:ext cx="4038600" cy="1753394"/>
+            <a:chOff x="2590800" y="1676400"/>
+            <a:chExt cx="4038600" cy="1753394"/>
+          </a:xfrm>
+        </p:grpSpPr>
+        <p:sp>
+          <p:nvSpPr>
+            <p:cNvPr id="10" name="TextBox 9"/>
+            <p:cNvSpPr txBox="1"/>
+            <p:nvPr/>
+          </p:nvSpPr>
+          <p:spPr>
+            <a:xfrm>
+              <a:off x="3733800" y="1676400"/>
+              <a:ext cx="1752600" cy="646331"/>
+            </a:xfrm>
+            <a:prstGeom prst="rect">
+              <a:avLst/>
+            </a:prstGeom>
+            <a:noFill/>
+          </p:spPr>
+          <p:txBody>
+            <a:bodyPr wrap="square" rtlCol="0">
+              <a:spAutoFit/>
+            </a:bodyPr>
+            <a:lstStyle/>
+            <a:p>
+              <a:pPr algn="ctr"/>
+              <a:r>
+                <a:rPr lang="ru-RU" dirty="0" smtClean="0"/>
+                <a:t>Общий формат</a:t>
+              </a:r>
+            </a:p>
+            <a:p>
+              <a:pPr algn="ctr"/>
+              <a:r>
+                <a:rPr lang="ru-RU" dirty="0" smtClean="0"/>
+                <a:t>данных</a:t>
+              </a:r>
+              <a:endParaRPr lang="ru-RU" dirty="0"/>
+            </a:p>
+          </p:txBody>
+        </p:sp>
+        <p:grpSp>
+          <p:nvGrpSpPr>
+            <p:cNvPr id="21" name="Группа 20"/>
+            <p:cNvGrpSpPr/>
+            <p:nvPr/>
+          </p:nvGrpSpPr>
+          <p:grpSpPr>
+            <a:xfrm>
+              <a:off x="4114747" y="2438400"/>
+              <a:ext cx="990706" cy="991394"/>
+              <a:chOff x="4038600" y="2362200"/>
+              <a:chExt cx="1143000" cy="1143794"/>
+            </a:xfrm>
+          </p:grpSpPr>
+          <p:sp>
+            <p:nvSpPr>
+              <p:cNvPr id="6" name="Прямоугольник 5"/>
+              <p:cNvSpPr/>
+              <p:nvPr/>
+            </p:nvSpPr>
+            <p:spPr>
+              <a:xfrm>
+                <a:off x="4038600" y="2362200"/>
+                <a:ext cx="1143000" cy="1143000"/>
+              </a:xfrm>
+              <a:prstGeom prst="rect">
+                <a:avLst/>
+              </a:prstGeom>
+            </p:spPr>
+            <p:style>
+              <a:lnRef idx="2">
+                <a:schemeClr val="accent6">
+                  <a:shade val="50000"/>
+                </a:schemeClr>
+              </a:lnRef>
+              <a:fillRef idx="1">
+                <a:schemeClr val="accent6"/>
+              </a:fillRef>
+              <a:effectRef idx="0">
+                <a:schemeClr val="accent6"/>
+              </a:effectRef>
+              <a:fontRef idx="minor">
+                <a:schemeClr val="lt1"/>
+              </a:fontRef>
+            </p:style>
+            <p:txBody>
+              <a:bodyPr rtlCol="0" anchor="ctr"/>
+              <a:lstStyle/>
+              <a:p>
+                <a:pPr algn="ctr"/>
+                <a:endParaRPr lang="ru-RU"/>
+              </a:p>
+            </p:txBody>
+          </p:sp>
+          <p:sp>
+            <p:nvSpPr>
+              <p:cNvPr id="7" name="Прямоугольник 6"/>
+              <p:cNvSpPr/>
+              <p:nvPr/>
+            </p:nvSpPr>
+            <p:spPr>
+              <a:xfrm>
+                <a:off x="4038600" y="2590800"/>
+                <a:ext cx="1143000" cy="228600"/>
+              </a:xfrm>
+              <a:prstGeom prst="rect">
+                <a:avLst/>
+              </a:prstGeom>
+            </p:spPr>
+            <p:style>
+              <a:lnRef idx="2">
+                <a:schemeClr val="accent6">
+                  <a:shade val="50000"/>
+                </a:schemeClr>
+              </a:lnRef>
+              <a:fillRef idx="1">
+                <a:schemeClr val="accent6"/>
+              </a:fillRef>
+              <a:effectRef idx="0">
+                <a:schemeClr val="accent6"/>
+              </a:effectRef>
+              <a:fontRef idx="minor">
+                <a:schemeClr val="lt1"/>
+              </a:fontRef>
+            </p:style>
+            <p:txBody>
+              <a:bodyPr rtlCol="0" anchor="ctr"/>
+              <a:lstStyle/>
+              <a:p>
+                <a:pPr algn="ctr"/>
+                <a:endParaRPr lang="ru-RU"/>
+              </a:p>
+            </p:txBody>
+          </p:sp>
+          <p:sp>
+            <p:nvSpPr>
+              <p:cNvPr id="8" name="Прямоугольник 7"/>
+              <p:cNvSpPr/>
+              <p:nvPr/>
+            </p:nvSpPr>
+            <p:spPr>
+              <a:xfrm>
+                <a:off x="4038600" y="3048000"/>
+                <a:ext cx="1143000" cy="228600"/>
+              </a:xfrm>
+              <a:prstGeom prst="rect">
+                <a:avLst/>
+              </a:prstGeom>
+            </p:spPr>
+            <p:style>
+              <a:lnRef idx="2">
+                <a:schemeClr val="accent6">
+                  <a:shade val="50000"/>
+                </a:schemeClr>
+              </a:lnRef>
+              <a:fillRef idx="1">
+                <a:schemeClr val="accent6"/>
+              </a:fillRef>
+              <a:effectRef idx="0">
+                <a:schemeClr val="accent6"/>
+              </a:effectRef>
+              <a:fontRef idx="minor">
+                <a:schemeClr val="lt1"/>
+              </a:fontRef>
+            </p:style>
+            <p:txBody>
+              <a:bodyPr rtlCol="0" anchor="ctr"/>
+              <a:lstStyle/>
+              <a:p>
+                <a:pPr algn="ctr"/>
+                <a:endParaRPr lang="ru-RU"/>
+              </a:p>
+            </p:txBody>
+          </p:sp>
+          <p:cxnSp>
+            <p:nvCxnSpPr>
+              <p:cNvPr id="12" name="Прямая соединительная линия 11"/>
+              <p:cNvCxnSpPr>
+                <a:stCxn id="6" idx="0"/>
+                <a:endCxn id="6" idx="2"/>
+              </p:cNvCxnSpPr>
+              <p:nvPr/>
+            </p:nvCxnSpPr>
+            <p:spPr>
+              <a:xfrm rot="16200000" flipH="1">
+                <a:off x="4038600" y="2933700"/>
+                <a:ext cx="1143000" cy="1588"/>
+              </a:xfrm>
+              <a:prstGeom prst="line">
+                <a:avLst/>
+              </a:prstGeom>
+            </p:spPr>
+            <p:style>
+              <a:lnRef idx="2">
+                <a:schemeClr val="accent6">
+                  <a:shade val="50000"/>
+                </a:schemeClr>
+              </a:lnRef>
+              <a:fillRef idx="1">
+                <a:schemeClr val="accent6"/>
+              </a:fillRef>
+              <a:effectRef idx="0">
+                <a:schemeClr val="accent6"/>
+              </a:effectRef>
+              <a:fontRef idx="minor">
+                <a:schemeClr val="lt1"/>
+              </a:fontRef>
+            </p:style>
+          </p:cxnSp>
+          <p:cxnSp>
+            <p:nvCxnSpPr>
+              <p:cNvPr id="18" name="Прямая соединительная линия 17"/>
+              <p:cNvCxnSpPr/>
+              <p:nvPr/>
+            </p:nvCxnSpPr>
+            <p:spPr>
+              <a:xfrm rot="5400000">
+                <a:off x="3762664" y="2933700"/>
+                <a:ext cx="1143000" cy="1588"/>
+              </a:xfrm>
+              <a:prstGeom prst="line">
+                <a:avLst/>
+              </a:prstGeom>
+            </p:spPr>
+            <p:style>
+              <a:lnRef idx="2">
+                <a:schemeClr val="accent6">
+                  <a:shade val="50000"/>
+                </a:schemeClr>
+              </a:lnRef>
+              <a:fillRef idx="1">
+                <a:schemeClr val="accent6"/>
+              </a:fillRef>
+              <a:effectRef idx="0">
+                <a:schemeClr val="accent6"/>
+              </a:effectRef>
+              <a:fontRef idx="minor">
+                <a:schemeClr val="lt1"/>
+              </a:fontRef>
+            </p:style>
+          </p:cxnSp>
+          <p:cxnSp>
+            <p:nvCxnSpPr>
+              <p:cNvPr id="20" name="Прямая соединительная линия 19"/>
+              <p:cNvCxnSpPr/>
+              <p:nvPr/>
+            </p:nvCxnSpPr>
+            <p:spPr>
+              <a:xfrm rot="16200000" flipH="1">
+                <a:off x="4315330" y="2932906"/>
+                <a:ext cx="1143000" cy="1588"/>
+              </a:xfrm>
+              <a:prstGeom prst="line">
+                <a:avLst/>
+              </a:prstGeom>
+            </p:spPr>
+            <p:style>
+              <a:lnRef idx="2">
+                <a:schemeClr val="accent6">
+                  <a:shade val="50000"/>
+                </a:schemeClr>
+              </a:lnRef>
+              <a:fillRef idx="1">
+                <a:schemeClr val="accent6"/>
+              </a:fillRef>
+              <a:effectRef idx="0">
+                <a:schemeClr val="accent6"/>
+              </a:effectRef>
+              <a:fontRef idx="minor">
+                <a:schemeClr val="lt1"/>
+              </a:fontRef>
+            </p:style>
+          </p:cxnSp>
+        </p:grpSp>
+        <p:cxnSp>
+          <p:nvCxnSpPr>
+            <p:cNvPr id="23" name="Прямая соединительная линия 22"/>
+            <p:cNvCxnSpPr/>
+            <p:nvPr/>
+          </p:nvCxnSpPr>
+          <p:spPr>
+            <a:xfrm>
+              <a:off x="2590800" y="2971800"/>
+              <a:ext cx="1371600" cy="1588"/>
+            </a:xfrm>
+            <a:prstGeom prst="line">
+              <a:avLst/>
+            </a:prstGeom>
+            <a:ln>
+              <a:prstDash val="dash"/>
+            </a:ln>
+          </p:spPr>
+          <p:style>
+            <a:lnRef idx="3">
+              <a:schemeClr val="dk1"/>
+            </a:lnRef>
+            <a:fillRef idx="0">
+              <a:schemeClr val="dk1"/>
+            </a:fillRef>
+            <a:effectRef idx="2">
+              <a:schemeClr val="dk1"/>
+            </a:effectRef>
+            <a:fontRef idx="minor">
+              <a:schemeClr val="tx1"/>
+            </a:fontRef>
+          </p:style>
+        </p:cxnSp>
+        <p:cxnSp>
+          <p:nvCxnSpPr>
+            <p:cNvPr id="24" name="Прямая соединительная линия 23"/>
+            <p:cNvCxnSpPr/>
+            <p:nvPr/>
+          </p:nvCxnSpPr>
+          <p:spPr>
+            <a:xfrm>
+              <a:off x="5257800" y="2971800"/>
+              <a:ext cx="1371600" cy="1588"/>
+            </a:xfrm>
+            <a:prstGeom prst="line">
+              <a:avLst/>
+            </a:prstGeom>
+            <a:ln>
+              <a:prstDash val="dash"/>
+            </a:ln>
+          </p:spPr>
+          <p:style>
+            <a:lnRef idx="3">
+              <a:schemeClr val="dk1"/>
+            </a:lnRef>
+            <a:fillRef idx="0">
+              <a:schemeClr val="dk1"/>
+            </a:fillRef>
+            <a:effectRef idx="2">
+              <a:schemeClr val="dk1"/>
+            </a:effectRef>
+            <a:fontRef idx="minor">
+              <a:schemeClr val="tx1"/>
+            </a:fontRef>
+          </p:style>
+        </p:cxnSp>
+      </p:grpSp>
+      <p:sp>
+        <p:nvSpPr>
+          <p:cNvPr id="39" name="Цилиндр 38"/>
+          <p:cNvSpPr/>
+          <p:nvPr/>
+        </p:nvSpPr>
+        <p:spPr>
+          <a:xfrm>
+            <a:off x="3810000" y="4648200"/>
+            <a:ext cx="1600200" cy="1447800"/>
+          </a:xfrm>
+          <a:prstGeom prst="can">
+            <a:avLst>
+              <a:gd name="adj" fmla="val 20455"/>
+            </a:avLst>
+          </a:prstGeom>
+        </p:spPr>
+        <p:style>
+          <a:lnRef idx="2">
+            <a:schemeClr val="accent1">
+              <a:shade val="50000"/>
+            </a:schemeClr>
+          </a:lnRef>
+          <a:fillRef idx="1">
+            <a:schemeClr val="accent1"/>
+          </a:fillRef>
+          <a:effectRef idx="0">
+            <a:schemeClr val="accent1"/>
+          </a:effectRef>
+          <a:fontRef idx="minor">
+            <a:schemeClr val="lt1"/>
+          </a:fontRef>
+        </p:style>
+        <p:txBody>
+          <a:bodyPr rtlCol="0" anchor="ctr"/>
+          <a:lstStyle/>
+          <a:p>
+            <a:pPr algn="ctr"/>
+            <a:r>
+              <a:rPr lang="ru-RU" dirty="0" smtClean="0"/>
+              <a:t>База</a:t>
+            </a:r>
+          </a:p>
+          <a:p>
+            <a:pPr algn="ctr"/>
+            <a:r>
+              <a:rPr lang="ru-RU" dirty="0" smtClean="0"/>
+              <a:t>Данных</a:t>
+            </a:r>
+          </a:p>
+          <a:p>
+            <a:pPr algn="ctr"/>
+            <a:r>
+              <a:rPr lang="ru-RU" dirty="0" smtClean="0"/>
+              <a:t>№3</a:t>
+            </a:r>
+            <a:endParaRPr lang="ru-RU" dirty="0"/>
+          </a:p>
+        </p:txBody>
+      </p:sp>
+      <p:grpSp>
+        <p:nvGrpSpPr>
+          <p:cNvPr id="79" name="Группа 78"/>
+          <p:cNvGrpSpPr/>
+          <p:nvPr/>
+        </p:nvGrpSpPr>
+        <p:grpSpPr>
+          <a:xfrm>
+            <a:off x="914400" y="3429000"/>
+            <a:ext cx="2819400" cy="2398931"/>
+            <a:chOff x="914400" y="3429000"/>
+            <a:chExt cx="2819400" cy="2398931"/>
+          </a:xfrm>
+        </p:grpSpPr>
+        <p:grpSp>
+          <p:nvGrpSpPr>
+            <p:cNvPr id="32" name="Группа 31"/>
+            <p:cNvGrpSpPr/>
+            <p:nvPr/>
+          </p:nvGrpSpPr>
+          <p:grpSpPr>
+            <a:xfrm>
+              <a:off x="2133600" y="4191000"/>
+              <a:ext cx="838094" cy="838676"/>
+              <a:chOff x="4038600" y="2362200"/>
+              <a:chExt cx="1143000" cy="1143794"/>
+            </a:xfrm>
+          </p:grpSpPr>
+          <p:sp>
+            <p:nvSpPr>
+              <p:cNvPr id="33" name="Прямоугольник 32"/>
+              <p:cNvSpPr/>
+              <p:nvPr/>
+            </p:nvSpPr>
+            <p:spPr>
+              <a:xfrm>
+                <a:off x="4038600" y="2362200"/>
+                <a:ext cx="1143000" cy="1143000"/>
+              </a:xfrm>
+              <a:prstGeom prst="rect">
+                <a:avLst/>
+              </a:prstGeom>
+            </p:spPr>
+            <p:style>
+              <a:lnRef idx="2">
+                <a:schemeClr val="accent3">
+                  <a:shade val="50000"/>
+                </a:schemeClr>
+              </a:lnRef>
+              <a:fillRef idx="1">
+                <a:schemeClr val="accent3"/>
+              </a:fillRef>
+              <a:effectRef idx="0">
+                <a:schemeClr val="accent3"/>
+              </a:effectRef>
+              <a:fontRef idx="minor">
+                <a:schemeClr val="lt1"/>
+              </a:fontRef>
+            </p:style>
+            <p:txBody>
+              <a:bodyPr rtlCol="0" anchor="ctr"/>
+              <a:lstStyle/>
+              <a:p>
+                <a:pPr algn="ctr"/>
+                <a:endParaRPr lang="ru-RU"/>
+              </a:p>
+            </p:txBody>
+          </p:sp>
+          <p:sp>
+            <p:nvSpPr>
+              <p:cNvPr id="34" name="Прямоугольник 33"/>
+              <p:cNvSpPr/>
+              <p:nvPr/>
+            </p:nvSpPr>
+            <p:spPr>
+              <a:xfrm>
+                <a:off x="4038600" y="2590800"/>
+                <a:ext cx="1143000" cy="228600"/>
+              </a:xfrm>
+              <a:prstGeom prst="rect">
+                <a:avLst/>
+              </a:prstGeom>
+            </p:spPr>
+            <p:style>
+              <a:lnRef idx="2">
+                <a:schemeClr val="accent3">
+                  <a:shade val="50000"/>
+                </a:schemeClr>
+              </a:lnRef>
+              <a:fillRef idx="1">
+                <a:schemeClr val="accent3"/>
+              </a:fillRef>
+              <a:effectRef idx="0">
+                <a:schemeClr val="accent3"/>
+              </a:effectRef>
+              <a:fontRef idx="minor">
+                <a:schemeClr val="lt1"/>
+              </a:fontRef>
+            </p:style>
+            <p:txBody>
+              <a:bodyPr rtlCol="0" anchor="ctr"/>
+              <a:lstStyle/>
+              <a:p>
+                <a:pPr algn="ctr"/>
+                <a:endParaRPr lang="ru-RU"/>
+              </a:p>
+            </p:txBody>
+          </p:sp>
+          <p:sp>
+            <p:nvSpPr>
+              <p:cNvPr id="35" name="Прямоугольник 34"/>
+              <p:cNvSpPr/>
+              <p:nvPr/>
+            </p:nvSpPr>
+            <p:spPr>
+              <a:xfrm>
+                <a:off x="4038600" y="3048000"/>
+                <a:ext cx="1143000" cy="228600"/>
+              </a:xfrm>
+              <a:prstGeom prst="rect">
+                <a:avLst/>
+              </a:prstGeom>
+            </p:spPr>
+            <p:style>
+              <a:lnRef idx="2">
+                <a:schemeClr val="accent3">
+                  <a:shade val="50000"/>
+                </a:schemeClr>
+              </a:lnRef>
+              <a:fillRef idx="1">
+                <a:schemeClr val="accent3"/>
+              </a:fillRef>
+              <a:effectRef idx="0">
+                <a:schemeClr val="accent3"/>
+              </a:effectRef>
+              <a:fontRef idx="minor">
+                <a:schemeClr val="lt1"/>
+              </a:fontRef>
+            </p:style>
+            <p:txBody>
+              <a:bodyPr rtlCol="0" anchor="ctr"/>
+              <a:lstStyle/>
+              <a:p>
+                <a:pPr algn="ctr"/>
+                <a:endParaRPr lang="ru-RU"/>
+              </a:p>
+            </p:txBody>
+          </p:sp>
+          <p:cxnSp>
+            <p:nvCxnSpPr>
+              <p:cNvPr id="36" name="Прямая соединительная линия 35"/>
+              <p:cNvCxnSpPr>
+                <a:stCxn id="33" idx="0"/>
+                <a:endCxn id="33" idx="2"/>
+              </p:cNvCxnSpPr>
+              <p:nvPr/>
+            </p:nvCxnSpPr>
+            <p:spPr>
+              <a:xfrm rot="16200000" flipH="1">
+                <a:off x="4038600" y="2933700"/>
+                <a:ext cx="1143000" cy="1588"/>
+              </a:xfrm>
+              <a:prstGeom prst="line">
+                <a:avLst/>
+              </a:prstGeom>
+            </p:spPr>
+            <p:style>
+              <a:lnRef idx="2">
+                <a:schemeClr val="accent3">
+                  <a:shade val="50000"/>
+                </a:schemeClr>
+              </a:lnRef>
+              <a:fillRef idx="1">
+                <a:schemeClr val="accent3"/>
+              </a:fillRef>
+              <a:effectRef idx="0">
+                <a:schemeClr val="accent3"/>
+              </a:effectRef>
+              <a:fontRef idx="minor">
+                <a:schemeClr val="lt1"/>
+              </a:fontRef>
+            </p:style>
+          </p:cxnSp>
+          <p:cxnSp>
+            <p:nvCxnSpPr>
+              <p:cNvPr id="37" name="Прямая соединительная линия 36"/>
+              <p:cNvCxnSpPr/>
+              <p:nvPr/>
+            </p:nvCxnSpPr>
+            <p:spPr>
+              <a:xfrm rot="5400000">
+                <a:off x="3762664" y="2933700"/>
+                <a:ext cx="1143000" cy="1588"/>
+              </a:xfrm>
+              <a:prstGeom prst="line">
+                <a:avLst/>
+              </a:prstGeom>
+            </p:spPr>
+            <p:style>
+              <a:lnRef idx="2">
+                <a:schemeClr val="accent3">
+                  <a:shade val="50000"/>
+                </a:schemeClr>
+              </a:lnRef>
+              <a:fillRef idx="1">
+                <a:schemeClr val="accent3"/>
+              </a:fillRef>
+              <a:effectRef idx="0">
+                <a:schemeClr val="accent3"/>
+              </a:effectRef>
+              <a:fontRef idx="minor">
+                <a:schemeClr val="lt1"/>
+              </a:fontRef>
+            </p:style>
+          </p:cxnSp>
+          <p:cxnSp>
+            <p:nvCxnSpPr>
+              <p:cNvPr id="38" name="Прямая соединительная линия 37"/>
+              <p:cNvCxnSpPr/>
+              <p:nvPr/>
+            </p:nvCxnSpPr>
+            <p:spPr>
+              <a:xfrm rot="16200000" flipH="1">
+                <a:off x="4315330" y="2932906"/>
+                <a:ext cx="1143000" cy="1588"/>
+              </a:xfrm>
+              <a:prstGeom prst="line">
+                <a:avLst/>
+              </a:prstGeom>
+            </p:spPr>
+            <p:style>
+              <a:lnRef idx="2">
+                <a:schemeClr val="accent3">
+                  <a:shade val="50000"/>
+                </a:schemeClr>
+              </a:lnRef>
+              <a:fillRef idx="1">
+                <a:schemeClr val="accent3"/>
+              </a:fillRef>
+              <a:effectRef idx="0">
+                <a:schemeClr val="accent3"/>
+              </a:effectRef>
+              <a:fontRef idx="minor">
+                <a:schemeClr val="lt1"/>
+              </a:fontRef>
+            </p:style>
+          </p:cxnSp>
+        </p:grpSp>
+        <p:cxnSp>
+          <p:nvCxnSpPr>
+            <p:cNvPr id="40" name="Прямая соединительная линия 39"/>
+            <p:cNvCxnSpPr/>
+            <p:nvPr/>
+          </p:nvCxnSpPr>
+          <p:spPr>
+            <a:xfrm rot="16200000" flipH="1">
+              <a:off x="1333500" y="3467100"/>
+              <a:ext cx="762000" cy="685800"/>
+            </a:xfrm>
+            <a:prstGeom prst="line">
+              <a:avLst/>
+            </a:prstGeom>
+            <a:ln>
+              <a:prstDash val="dash"/>
+            </a:ln>
+          </p:spPr>
+          <p:style>
+            <a:lnRef idx="3">
+              <a:schemeClr val="dk1"/>
+            </a:lnRef>
+            <a:fillRef idx="0">
+              <a:schemeClr val="dk1"/>
+            </a:fillRef>
+            <a:effectRef idx="2">
+              <a:schemeClr val="dk1"/>
+            </a:effectRef>
+            <a:fontRef idx="minor">
+              <a:schemeClr val="tx1"/>
+            </a:fontRef>
+          </p:style>
+        </p:cxnSp>
+        <p:cxnSp>
+          <p:nvCxnSpPr>
+            <p:cNvPr id="41" name="Прямая соединительная линия 40"/>
+            <p:cNvCxnSpPr/>
+            <p:nvPr/>
+          </p:nvCxnSpPr>
+          <p:spPr>
+            <a:xfrm>
+              <a:off x="3048000" y="5105400"/>
+              <a:ext cx="685800" cy="609600"/>
+            </a:xfrm>
+            <a:prstGeom prst="line">
+              <a:avLst/>
+            </a:prstGeom>
+            <a:ln>
+              <a:prstDash val="dash"/>
+            </a:ln>
+          </p:spPr>
+          <p:style>
+            <a:lnRef idx="3">
+              <a:schemeClr val="dk1"/>
+            </a:lnRef>
+            <a:fillRef idx="0">
+              <a:schemeClr val="dk1"/>
+            </a:fillRef>
+            <a:effectRef idx="2">
+              <a:schemeClr val="dk1"/>
+            </a:effectRef>
+            <a:fontRef idx="minor">
+              <a:schemeClr val="tx1"/>
+            </a:fontRef>
+          </p:style>
+        </p:cxnSp>
+        <p:sp>
+          <p:nvSpPr>
+            <p:cNvPr id="74" name="TextBox 73"/>
+            <p:cNvSpPr txBox="1"/>
+            <p:nvPr/>
+          </p:nvSpPr>
+          <p:spPr>
+            <a:xfrm>
+              <a:off x="914400" y="5181600"/>
+              <a:ext cx="1752600" cy="646331"/>
+            </a:xfrm>
+            <a:prstGeom prst="rect">
+              <a:avLst/>
+            </a:prstGeom>
+            <a:noFill/>
+          </p:spPr>
+          <p:txBody>
+            <a:bodyPr wrap="square" rtlCol="0">
+              <a:spAutoFit/>
+            </a:bodyPr>
+            <a:lstStyle/>
+            <a:p>
+              <a:pPr algn="ctr"/>
+              <a:r>
+                <a:rPr lang="ru-RU" dirty="0" smtClean="0"/>
+                <a:t>Общий формат</a:t>
+              </a:r>
+            </a:p>
+            <a:p>
+              <a:pPr algn="ctr"/>
+              <a:r>
+                <a:rPr lang="ru-RU" dirty="0" smtClean="0"/>
+                <a:t>данных</a:t>
+              </a:r>
+              <a:endParaRPr lang="ru-RU" dirty="0"/>
+            </a:p>
+          </p:txBody>
+        </p:sp>
+      </p:grpSp>
+      <p:grpSp>
+        <p:nvGrpSpPr>
+          <p:cNvPr id="78" name="Группа 77"/>
+          <p:cNvGrpSpPr/>
+          <p:nvPr/>
+        </p:nvGrpSpPr>
+        <p:grpSpPr>
+          <a:xfrm>
+            <a:off x="5486400" y="3429000"/>
+            <a:ext cx="2895600" cy="2362200"/>
+            <a:chOff x="5486400" y="3429000"/>
+            <a:chExt cx="2895600" cy="2362200"/>
+          </a:xfrm>
+        </p:grpSpPr>
+        <p:grpSp>
+          <p:nvGrpSpPr>
+            <p:cNvPr id="60" name="Группа 59"/>
+            <p:cNvGrpSpPr/>
+            <p:nvPr/>
+          </p:nvGrpSpPr>
+          <p:grpSpPr>
+            <a:xfrm rot="5400000">
+              <a:off x="6172015" y="4190709"/>
+              <a:ext cx="838094" cy="838676"/>
+              <a:chOff x="4038600" y="2362200"/>
+              <a:chExt cx="1143000" cy="1143794"/>
+            </a:xfrm>
+          </p:grpSpPr>
+          <p:sp>
+            <p:nvSpPr>
+              <p:cNvPr id="61" name="Прямоугольник 60"/>
+              <p:cNvSpPr/>
+              <p:nvPr/>
+            </p:nvSpPr>
+            <p:spPr>
+              <a:xfrm>
+                <a:off x="4038600" y="2362200"/>
+                <a:ext cx="1143000" cy="1143000"/>
+              </a:xfrm>
+              <a:prstGeom prst="rect">
+                <a:avLst/>
+              </a:prstGeom>
+            </p:spPr>
+            <p:style>
+              <a:lnRef idx="2">
+                <a:schemeClr val="accent2">
+                  <a:shade val="50000"/>
+                </a:schemeClr>
+              </a:lnRef>
+              <a:fillRef idx="1">
+                <a:schemeClr val="accent2"/>
+              </a:fillRef>
+              <a:effectRef idx="0">
+                <a:schemeClr val="accent2"/>
+              </a:effectRef>
+              <a:fontRef idx="minor">
+                <a:schemeClr val="lt1"/>
+              </a:fontRef>
+            </p:style>
+            <p:txBody>
+              <a:bodyPr rtlCol="0" anchor="ctr"/>
+              <a:lstStyle/>
+              <a:p>
+                <a:pPr algn="ctr"/>
+                <a:endParaRPr lang="ru-RU"/>
+              </a:p>
+            </p:txBody>
+          </p:sp>
+          <p:sp>
+            <p:nvSpPr>
+              <p:cNvPr id="62" name="Прямоугольник 61"/>
+              <p:cNvSpPr/>
+              <p:nvPr/>
+            </p:nvSpPr>
+            <p:spPr>
+              <a:xfrm>
+                <a:off x="4038600" y="2590800"/>
+                <a:ext cx="1143000" cy="228600"/>
+              </a:xfrm>
+              <a:prstGeom prst="rect">
+                <a:avLst/>
+              </a:prstGeom>
+            </p:spPr>
+            <p:style>
+              <a:lnRef idx="2">
+                <a:schemeClr val="accent2">
+                  <a:shade val="50000"/>
+                </a:schemeClr>
+              </a:lnRef>
+              <a:fillRef idx="1">
+                <a:schemeClr val="accent2"/>
+              </a:fillRef>
+              <a:effectRef idx="0">
+                <a:schemeClr val="accent2"/>
+              </a:effectRef>
+              <a:fontRef idx="minor">
+                <a:schemeClr val="lt1"/>
+              </a:fontRef>
+            </p:style>
+            <p:txBody>
+              <a:bodyPr rtlCol="0" anchor="ctr"/>
+              <a:lstStyle/>
+              <a:p>
+                <a:pPr algn="ctr"/>
+                <a:endParaRPr lang="ru-RU"/>
+              </a:p>
+            </p:txBody>
+          </p:sp>
+          <p:sp>
+            <p:nvSpPr>
+              <p:cNvPr id="63" name="Прямоугольник 62"/>
+              <p:cNvSpPr/>
+              <p:nvPr/>
+            </p:nvSpPr>
+            <p:spPr>
+              <a:xfrm>
+                <a:off x="4038600" y="3048000"/>
+                <a:ext cx="1143000" cy="228600"/>
+              </a:xfrm>
+              <a:prstGeom prst="rect">
+                <a:avLst/>
+              </a:prstGeom>
+            </p:spPr>
+            <p:style>
+              <a:lnRef idx="2">
+                <a:schemeClr val="accent2">
+                  <a:shade val="50000"/>
+                </a:schemeClr>
+              </a:lnRef>
+              <a:fillRef idx="1">
+                <a:schemeClr val="accent2"/>
+              </a:fillRef>
+              <a:effectRef idx="0">
+                <a:schemeClr val="accent2"/>
+              </a:effectRef>
+              <a:fontRef idx="minor">
+                <a:schemeClr val="lt1"/>
+              </a:fontRef>
+            </p:style>
+            <p:txBody>
+              <a:bodyPr rtlCol="0" anchor="ctr"/>
+              <a:lstStyle/>
+              <a:p>
+                <a:pPr algn="ctr"/>
+                <a:endParaRPr lang="ru-RU"/>
+              </a:p>
+            </p:txBody>
+          </p:sp>
+          <p:cxnSp>
+            <p:nvCxnSpPr>
+              <p:cNvPr id="64" name="Прямая соединительная линия 63"/>
+              <p:cNvCxnSpPr>
+                <a:stCxn id="61" idx="0"/>
+                <a:endCxn id="61" idx="2"/>
+              </p:cNvCxnSpPr>
+              <p:nvPr/>
+            </p:nvCxnSpPr>
+            <p:spPr>
+              <a:xfrm rot="16200000" flipH="1">
+                <a:off x="4038600" y="2933700"/>
+                <a:ext cx="1143000" cy="1588"/>
+              </a:xfrm>
+              <a:prstGeom prst="line">
+                <a:avLst/>
+              </a:prstGeom>
+            </p:spPr>
+            <p:style>
+              <a:lnRef idx="2">
+                <a:schemeClr val="accent2">
+                  <a:shade val="50000"/>
+                </a:schemeClr>
+              </a:lnRef>
+              <a:fillRef idx="1">
+                <a:schemeClr val="accent2"/>
+              </a:fillRef>
+              <a:effectRef idx="0">
+                <a:schemeClr val="accent2"/>
+              </a:effectRef>
+              <a:fontRef idx="minor">
+                <a:schemeClr val="lt1"/>
+              </a:fontRef>
+            </p:style>
+          </p:cxnSp>
+          <p:cxnSp>
+            <p:nvCxnSpPr>
+              <p:cNvPr id="65" name="Прямая соединительная линия 64"/>
+              <p:cNvCxnSpPr/>
+              <p:nvPr/>
+            </p:nvCxnSpPr>
+            <p:spPr>
+              <a:xfrm rot="5400000">
+                <a:off x="3762664" y="2933700"/>
+                <a:ext cx="1143000" cy="1588"/>
+              </a:xfrm>
+              <a:prstGeom prst="line">
+                <a:avLst/>
+              </a:prstGeom>
+            </p:spPr>
+            <p:style>
+              <a:lnRef idx="2">
+                <a:schemeClr val="accent2">
+                  <a:shade val="50000"/>
+                </a:schemeClr>
+              </a:lnRef>
+              <a:fillRef idx="1">
+                <a:schemeClr val="accent2"/>
+              </a:fillRef>
+              <a:effectRef idx="0">
+                <a:schemeClr val="accent2"/>
+              </a:effectRef>
+              <a:fontRef idx="minor">
+                <a:schemeClr val="lt1"/>
+              </a:fontRef>
+            </p:style>
+          </p:cxnSp>
+          <p:cxnSp>
+            <p:nvCxnSpPr>
+              <p:cNvPr id="66" name="Прямая соединительная линия 65"/>
+              <p:cNvCxnSpPr/>
+              <p:nvPr/>
+            </p:nvCxnSpPr>
+            <p:spPr>
+              <a:xfrm rot="16200000" flipH="1">
+                <a:off x="4315330" y="2932906"/>
+                <a:ext cx="1143000" cy="1588"/>
+              </a:xfrm>
+              <a:prstGeom prst="line">
+                <a:avLst/>
+              </a:prstGeom>
+            </p:spPr>
+            <p:style>
+              <a:lnRef idx="2">
+                <a:schemeClr val="accent2">
+                  <a:shade val="50000"/>
+                </a:schemeClr>
+              </a:lnRef>
+              <a:fillRef idx="1">
+                <a:schemeClr val="accent2"/>
+              </a:fillRef>
+              <a:effectRef idx="0">
+                <a:schemeClr val="accent2"/>
+              </a:effectRef>
+              <a:fontRef idx="minor">
+                <a:schemeClr val="lt1"/>
+              </a:fontRef>
+            </p:style>
+          </p:cxnSp>
+        </p:grpSp>
+        <p:cxnSp>
+          <p:nvCxnSpPr>
+            <p:cNvPr id="67" name="Прямая соединительная линия 66"/>
+            <p:cNvCxnSpPr/>
+            <p:nvPr/>
+          </p:nvCxnSpPr>
+          <p:spPr>
+            <a:xfrm rot="5400000">
+              <a:off x="7048500" y="3467100"/>
+              <a:ext cx="762000" cy="685800"/>
+            </a:xfrm>
+            <a:prstGeom prst="line">
+              <a:avLst/>
+            </a:prstGeom>
+            <a:ln>
+              <a:prstDash val="dash"/>
+            </a:ln>
+          </p:spPr>
+          <p:style>
+            <a:lnRef idx="3">
+              <a:schemeClr val="dk1"/>
+            </a:lnRef>
+            <a:fillRef idx="0">
+              <a:schemeClr val="dk1"/>
+            </a:fillRef>
+            <a:effectRef idx="2">
+              <a:schemeClr val="dk1"/>
+            </a:effectRef>
+            <a:fontRef idx="minor">
+              <a:schemeClr val="tx1"/>
+            </a:fontRef>
+          </p:style>
+        </p:cxnSp>
+        <p:cxnSp>
+          <p:nvCxnSpPr>
+            <p:cNvPr id="68" name="Прямая соединительная линия 67"/>
+            <p:cNvCxnSpPr/>
+            <p:nvPr/>
+          </p:nvCxnSpPr>
+          <p:spPr>
+            <a:xfrm rot="5400000">
+              <a:off x="5448300" y="5143500"/>
+              <a:ext cx="685800" cy="609600"/>
+            </a:xfrm>
+            <a:prstGeom prst="line">
+              <a:avLst/>
+            </a:prstGeom>
+            <a:ln>
+              <a:prstDash val="dash"/>
+            </a:ln>
+          </p:spPr>
+          <p:style>
+            <a:lnRef idx="3">
+              <a:schemeClr val="dk1"/>
+            </a:lnRef>
+            <a:fillRef idx="0">
+              <a:schemeClr val="dk1"/>
+            </a:fillRef>
+            <a:effectRef idx="2">
+              <a:schemeClr val="dk1"/>
+            </a:effectRef>
+            <a:fontRef idx="minor">
+              <a:schemeClr val="tx1"/>
+            </a:fontRef>
+          </p:style>
+        </p:cxnSp>
+        <p:sp>
+          <p:nvSpPr>
+            <p:cNvPr id="75" name="TextBox 74"/>
+            <p:cNvSpPr txBox="1"/>
+            <p:nvPr/>
+          </p:nvSpPr>
+          <p:spPr>
+            <a:xfrm>
+              <a:off x="6629400" y="5105400"/>
+              <a:ext cx="1752600" cy="646331"/>
+            </a:xfrm>
+            <a:prstGeom prst="rect">
+              <a:avLst/>
+            </a:prstGeom>
+            <a:noFill/>
+          </p:spPr>
+          <p:txBody>
+            <a:bodyPr wrap="square" rtlCol="0">
+              <a:spAutoFit/>
+            </a:bodyPr>
+            <a:lstStyle/>
+            <a:p>
+              <a:pPr algn="ctr"/>
+              <a:r>
+                <a:rPr lang="ru-RU" dirty="0" smtClean="0"/>
+                <a:t>Общий формат</a:t>
+              </a:r>
+            </a:p>
+            <a:p>
+              <a:pPr algn="ctr"/>
+              <a:r>
+                <a:rPr lang="ru-RU" dirty="0" smtClean="0"/>
+                <a:t>данных</a:t>
+              </a:r>
+              <a:endParaRPr lang="ru-RU" dirty="0"/>
+            </a:p>
+          </p:txBody>
+        </p:sp>
+      </p:grpSp>
     </p:spTree>
   </p:cSld>
   <p:clrMapOvr>
     <a:masterClrMapping/>
   </p:clrMapOvr>
+  <p:timing>
+    <p:tnLst>
+      <p:par>
+        <p:cTn id="1" dur="indefinite" restart="never" nodeType="tmRoot">
+          <p:childTnLst>
+            <p:seq concurrent="1" nextAc="seek">
+              <p:cTn id="2" dur="indefinite" nodeType="mainSeq">
+                <p:childTnLst>
+                  <p:par>
+                    <p:cTn id="3" fill="hold">
+                      <p:stCondLst>
+                        <p:cond delay="indefinite"/>
+                      </p:stCondLst>
+                      <p:childTnLst>
+                        <p:par>
+                          <p:cTn id="4" fill="hold">
+                            <p:stCondLst>
+                              <p:cond delay="0"/>
+                            </p:stCondLst>
+                            <p:childTnLst>
+                              <p:par>
+                                <p:cTn id="5" presetID="1" presetClass="entr" presetSubtype="0" fill="hold" grpId="0" nodeType="clickEffect">
+                                  <p:stCondLst>
+                                    <p:cond delay="0"/>
+                                  </p:stCondLst>
+                                  <p:childTnLst>
+                                    <p:set>
+                                      <p:cBhvr>
+                                        <p:cTn id="6" dur="1" fill="hold">
+                                          <p:stCondLst>
+                                            <p:cond delay="0"/>
+                                          </p:stCondLst>
+                                        </p:cTn>
+                                        <p:tgtEl>
+                                          <p:spTgt spid="4"/>
+                                        </p:tgtEl>
+                                        <p:attrNameLst>
+                                          <p:attrName>style.visibility</p:attrName>
+                                        </p:attrNameLst>
+                                      </p:cBhvr>
+                                      <p:to>
+                                        <p:strVal val="visible"/>
+                                      </p:to>
+                                    </p:set>
+                                  </p:childTnLst>
+                                </p:cTn>
+                              </p:par>
+                            </p:childTnLst>
+                          </p:cTn>
+                        </p:par>
+                      </p:childTnLst>
+                    </p:cTn>
+                  </p:par>
+                  <p:par>
+                    <p:cTn id="7" fill="hold">
+                      <p:stCondLst>
+                        <p:cond delay="indefinite"/>
+                      </p:stCondLst>
+                      <p:childTnLst>
+                        <p:par>
+                          <p:cTn id="8" fill="hold">
+                            <p:stCondLst>
+                              <p:cond delay="0"/>
+                            </p:stCondLst>
+                            <p:childTnLst>
+                              <p:par>
+                                <p:cTn id="9" presetID="1" presetClass="entr" presetSubtype="0" fill="hold" grpId="0" nodeType="clickEffect">
+                                  <p:stCondLst>
+                                    <p:cond delay="0"/>
+                                  </p:stCondLst>
+                                  <p:childTnLst>
+                                    <p:set>
+                                      <p:cBhvr>
+                                        <p:cTn id="10" dur="1" fill="hold">
+                                          <p:stCondLst>
+                                            <p:cond delay="0"/>
+                                          </p:stCondLst>
+                                        </p:cTn>
+                                        <p:tgtEl>
+                                          <p:spTgt spid="5"/>
+                                        </p:tgtEl>
+                                        <p:attrNameLst>
+                                          <p:attrName>style.visibility</p:attrName>
+                                        </p:attrNameLst>
+                                      </p:cBhvr>
+                                      <p:to>
+                                        <p:strVal val="visible"/>
+                                      </p:to>
+                                    </p:set>
+                                  </p:childTnLst>
+                                </p:cTn>
+                              </p:par>
+                            </p:childTnLst>
+                          </p:cTn>
+                        </p:par>
+                      </p:childTnLst>
+                    </p:cTn>
+                  </p:par>
+                  <p:par>
+                    <p:cTn id="11" fill="hold">
+                      <p:stCondLst>
+                        <p:cond delay="indefinite"/>
+                      </p:stCondLst>
+                      <p:childTnLst>
+                        <p:par>
+                          <p:cTn id="12" fill="hold">
+                            <p:stCondLst>
+                              <p:cond delay="0"/>
+                            </p:stCondLst>
+                            <p:childTnLst>
+                              <p:par>
+                                <p:cTn id="13" presetID="1" presetClass="entr" presetSubtype="0" fill="hold" nodeType="clickEffect">
+                                  <p:stCondLst>
+                                    <p:cond delay="0"/>
+                                  </p:stCondLst>
+                                  <p:childTnLst>
+                                    <p:set>
+                                      <p:cBhvr>
+                                        <p:cTn id="14" dur="1" fill="hold">
+                                          <p:stCondLst>
+                                            <p:cond delay="0"/>
+                                          </p:stCondLst>
+                                        </p:cTn>
+                                        <p:tgtEl>
+                                          <p:spTgt spid="77"/>
+                                        </p:tgtEl>
+                                        <p:attrNameLst>
+                                          <p:attrName>style.visibility</p:attrName>
+                                        </p:attrNameLst>
+                                      </p:cBhvr>
+                                      <p:to>
+                                        <p:strVal val="visible"/>
+                                      </p:to>
+                                    </p:set>
+                                  </p:childTnLst>
+                                </p:cTn>
+                              </p:par>
+                            </p:childTnLst>
+                          </p:cTn>
+                        </p:par>
+                      </p:childTnLst>
+                    </p:cTn>
+                  </p:par>
+                  <p:par>
+                    <p:cTn id="15" fill="hold">
+                      <p:stCondLst>
+                        <p:cond delay="indefinite"/>
+                      </p:stCondLst>
+                      <p:childTnLst>
+                        <p:par>
+                          <p:cTn id="16" fill="hold">
+                            <p:stCondLst>
+                              <p:cond delay="0"/>
+                            </p:stCondLst>
+                            <p:childTnLst>
+                              <p:par>
+                                <p:cTn id="17" presetID="1" presetClass="entr" presetSubtype="0" fill="hold" grpId="0" nodeType="clickEffect">
+                                  <p:stCondLst>
+                                    <p:cond delay="0"/>
+                                  </p:stCondLst>
+                                  <p:childTnLst>
+                                    <p:set>
+                                      <p:cBhvr>
+                                        <p:cTn id="18" dur="1" fill="hold">
+                                          <p:stCondLst>
+                                            <p:cond delay="0"/>
+                                          </p:stCondLst>
+                                        </p:cTn>
+                                        <p:tgtEl>
+                                          <p:spTgt spid="39"/>
+                                        </p:tgtEl>
+                                        <p:attrNameLst>
+                                          <p:attrName>style.visibility</p:attrName>
+                                        </p:attrNameLst>
+                                      </p:cBhvr>
+                                      <p:to>
+                                        <p:strVal val="visible"/>
+                                      </p:to>
+                                    </p:set>
+                                  </p:childTnLst>
+                                </p:cTn>
+                              </p:par>
+                            </p:childTnLst>
+                          </p:cTn>
+                        </p:par>
+                      </p:childTnLst>
+                    </p:cTn>
+                  </p:par>
+                  <p:par>
+                    <p:cTn id="19" fill="hold">
+                      <p:stCondLst>
+                        <p:cond delay="indefinite"/>
+                      </p:stCondLst>
+                      <p:childTnLst>
+                        <p:par>
+                          <p:cTn id="20" fill="hold">
+                            <p:stCondLst>
+                              <p:cond delay="0"/>
+                            </p:stCondLst>
+                            <p:childTnLst>
+                              <p:par>
+                                <p:cTn id="21" presetID="1" presetClass="entr" presetSubtype="0" fill="hold" nodeType="clickEffect">
+                                  <p:stCondLst>
+                                    <p:cond delay="0"/>
+                                  </p:stCondLst>
+                                  <p:childTnLst>
+                                    <p:set>
+                                      <p:cBhvr>
+                                        <p:cTn id="22" dur="1" fill="hold">
+                                          <p:stCondLst>
+                                            <p:cond delay="0"/>
+                                          </p:stCondLst>
+                                        </p:cTn>
+                                        <p:tgtEl>
+                                          <p:spTgt spid="78"/>
+                                        </p:tgtEl>
+                                        <p:attrNameLst>
+                                          <p:attrName>style.visibility</p:attrName>
+                                        </p:attrNameLst>
+                                      </p:cBhvr>
+                                      <p:to>
+                                        <p:strVal val="visible"/>
+                                      </p:to>
+                                    </p:set>
+                                  </p:childTnLst>
+                                </p:cTn>
+                              </p:par>
+                              <p:par>
+                                <p:cTn id="23" presetID="1" presetClass="entr" presetSubtype="0" fill="hold" nodeType="withEffect">
+                                  <p:stCondLst>
+                                    <p:cond delay="0"/>
+                                  </p:stCondLst>
+                                  <p:childTnLst>
+                                    <p:set>
+                                      <p:cBhvr>
+                                        <p:cTn id="24" dur="1" fill="hold">
+                                          <p:stCondLst>
+                                            <p:cond delay="0"/>
+                                          </p:stCondLst>
+                                        </p:cTn>
+                                        <p:tgtEl>
+                                          <p:spTgt spid="79"/>
+                                        </p:tgtEl>
+                                        <p:attrNameLst>
+                                          <p:attrName>style.visibility</p:attrName>
+                                        </p:attrNameLst>
+                                      </p:cBhvr>
+                                      <p:to>
+                                        <p:strVal val="visible"/>
+                                      </p:to>
+                                    </p:set>
+                                  </p:childTnLst>
+                                </p:cTn>
+                              </p:par>
+                            </p:childTnLst>
+                          </p:cTn>
+                        </p:par>
+                      </p:childTnLst>
+                    </p:cTn>
+                  </p:par>
+                  <p:par>
+                    <p:cTn id="25" fill="hold">
+                      <p:stCondLst>
+                        <p:cond delay="indefinite"/>
+                      </p:stCondLst>
+                      <p:childTnLst>
+                        <p:par>
+                          <p:cTn id="26" fill="hold">
+                            <p:stCondLst>
+                              <p:cond delay="0"/>
+                            </p:stCondLst>
+                            <p:childTnLst>
+                              <p:par>
+                                <p:cTn id="27" presetID="26" presetClass="emph" presetSubtype="0" fill="hold" nodeType="clickEffect">
+                                  <p:stCondLst>
+                                    <p:cond delay="0"/>
+                                  </p:stCondLst>
+                                  <p:childTnLst>
+                                    <p:animEffect transition="out" filter="fade">
+                                      <p:cBhvr>
+                                        <p:cTn id="28" dur="1000" tmFilter="0, 0; .2, .5; .8, .5; 1, 0"/>
+                                        <p:tgtEl>
+                                          <p:spTgt spid="78"/>
+                                        </p:tgtEl>
+                                      </p:cBhvr>
+                                    </p:animEffect>
+                                    <p:animScale>
+                                      <p:cBhvr>
+                                        <p:cTn id="29" dur="500" autoRev="1" fill="hold"/>
+                                        <p:tgtEl>
+                                          <p:spTgt spid="78"/>
+                                        </p:tgtEl>
+                                      </p:cBhvr>
+                                      <p:by x="105000" y="105000"/>
+                                    </p:animScale>
+                                  </p:childTnLst>
+                                </p:cTn>
+                              </p:par>
+                              <p:par>
+                                <p:cTn id="30" presetID="26" presetClass="emph" presetSubtype="0" fill="hold" nodeType="withEffect">
+                                  <p:stCondLst>
+                                    <p:cond delay="0"/>
+                                  </p:stCondLst>
+                                  <p:childTnLst>
+                                    <p:animEffect transition="out" filter="fade">
+                                      <p:cBhvr>
+                                        <p:cTn id="31" dur="1000" tmFilter="0, 0; .2, .5; .8, .5; 1, 0"/>
+                                        <p:tgtEl>
+                                          <p:spTgt spid="79"/>
+                                        </p:tgtEl>
+                                      </p:cBhvr>
+                                    </p:animEffect>
+                                    <p:animScale>
+                                      <p:cBhvr>
+                                        <p:cTn id="32" dur="500" autoRev="1" fill="hold"/>
+                                        <p:tgtEl>
+                                          <p:spTgt spid="79"/>
+                                        </p:tgtEl>
+                                      </p:cBhvr>
+                                      <p:by x="105000" y="105000"/>
+                                    </p:animScale>
+                                  </p:childTnLst>
+                                </p:cTn>
+                              </p:par>
+                            </p:childTnLst>
+                          </p:cTn>
+                        </p:par>
+                      </p:childTnLst>
+                    </p:cTn>
+                  </p:par>
+                </p:childTnLst>
+              </p:cTn>
+              <p:prevCondLst>
+                <p:cond evt="onPrev" delay="0">
+                  <p:tgtEl>
+                    <p:sldTgt/>
+                  </p:tgtEl>
+                </p:cond>
+              </p:prevCondLst>
+              <p:nextCondLst>
+                <p:cond evt="onNext" delay="0">
+                  <p:tgtEl>
+                    <p:sldTgt/>
+                  </p:tgtEl>
+                </p:cond>
+              </p:nextCondLst>
+            </p:seq>
+          </p:childTnLst>
+        </p:cTn>
+      </p:par>
+    </p:tnLst>
+    <p:bldLst>
+      <p:bldP spid="4" grpId="0" animBg="1"/>
+      <p:bldP spid="5" grpId="0" animBg="1"/>
+      <p:bldP spid="39" grpId="0" animBg="1"/>
+    </p:bldLst>
+  </p:timing>
 </p:sld>
 </file>
 
@@ -5519,30 +7213,651 @@
           </a:p>
         </p:txBody>
       </p:sp>
-      <p:sp>
-        <p:nvSpPr>
-          <p:cNvPr id="3" name="Содержимое 2"/>
-          <p:cNvSpPr>
-            <a:spLocks noGrp="1"/>
-          </p:cNvSpPr>
-          <p:nvPr>
-            <p:ph sz="quarter" idx="1"/>
-          </p:nvPr>
-        </p:nvSpPr>
-        <p:spPr/>
-        <p:txBody>
-          <a:bodyPr/>
-          <a:lstStyle/>
-          <a:p>
-            <a:endParaRPr lang="ru-RU"/>
-          </a:p>
-        </p:txBody>
-      </p:sp>
+      <p:grpSp>
+        <p:nvGrpSpPr>
+          <p:cNvPr id="13" name="Группа 12"/>
+          <p:cNvGrpSpPr/>
+          <p:nvPr/>
+        </p:nvGrpSpPr>
+        <p:grpSpPr>
+          <a:xfrm>
+            <a:off x="3962400" y="1219200"/>
+            <a:ext cx="3505200" cy="3505200"/>
+            <a:chOff x="3962400" y="1219200"/>
+            <a:chExt cx="3505200" cy="3505200"/>
+          </a:xfrm>
+        </p:grpSpPr>
+        <p:sp>
+          <p:nvSpPr>
+            <p:cNvPr id="5" name="Овал 4"/>
+            <p:cNvSpPr/>
+            <p:nvPr/>
+          </p:nvSpPr>
+          <p:spPr>
+            <a:xfrm>
+              <a:off x="3962400" y="1219200"/>
+              <a:ext cx="3505200" cy="3505200"/>
+            </a:xfrm>
+            <a:prstGeom prst="ellipse">
+              <a:avLst/>
+            </a:prstGeom>
+            <a:solidFill>
+              <a:schemeClr val="accent1">
+                <a:alpha val="53000"/>
+              </a:schemeClr>
+            </a:solidFill>
+          </p:spPr>
+          <p:style>
+            <a:lnRef idx="1">
+              <a:schemeClr val="accent1"/>
+            </a:lnRef>
+            <a:fillRef idx="2">
+              <a:schemeClr val="accent1"/>
+            </a:fillRef>
+            <a:effectRef idx="1">
+              <a:schemeClr val="accent1"/>
+            </a:effectRef>
+            <a:fontRef idx="minor">
+              <a:schemeClr val="dk1"/>
+            </a:fontRef>
+          </p:style>
+          <p:txBody>
+            <a:bodyPr rtlCol="0" anchor="ctr"/>
+            <a:lstStyle/>
+            <a:p>
+              <a:pPr algn="ctr"/>
+              <a:endParaRPr lang="ru-RU" dirty="0"/>
+            </a:p>
+          </p:txBody>
+        </p:sp>
+        <p:sp>
+          <p:nvSpPr>
+            <p:cNvPr id="9" name="TextBox 8"/>
+            <p:cNvSpPr txBox="1"/>
+            <p:nvPr/>
+          </p:nvSpPr>
+          <p:spPr>
+            <a:xfrm>
+              <a:off x="5638800" y="2044005"/>
+              <a:ext cx="1447800" cy="1384995"/>
+            </a:xfrm>
+            <a:prstGeom prst="rect">
+              <a:avLst/>
+            </a:prstGeom>
+            <a:noFill/>
+          </p:spPr>
+          <p:txBody>
+            <a:bodyPr wrap="square" rtlCol="0">
+              <a:spAutoFit/>
+            </a:bodyPr>
+            <a:lstStyle/>
+            <a:p>
+              <a:pPr algn="ctr"/>
+              <a:r>
+                <a:rPr lang="ru-RU" sz="2800" b="1" dirty="0" smtClean="0"/>
+                <a:t>База</a:t>
+              </a:r>
+            </a:p>
+            <a:p>
+              <a:pPr algn="ctr"/>
+              <a:r>
+                <a:rPr lang="ru-RU" sz="2800" b="1" dirty="0" smtClean="0"/>
+                <a:t>Данных</a:t>
+              </a:r>
+            </a:p>
+            <a:p>
+              <a:pPr algn="ctr"/>
+              <a:r>
+                <a:rPr lang="ru-RU" sz="2800" b="1" dirty="0" smtClean="0"/>
+                <a:t>№2</a:t>
+              </a:r>
+              <a:endParaRPr lang="ru-RU" sz="2800" b="1" dirty="0"/>
+            </a:p>
+          </p:txBody>
+        </p:sp>
+      </p:grpSp>
+      <p:grpSp>
+        <p:nvGrpSpPr>
+          <p:cNvPr id="12" name="Группа 11"/>
+          <p:cNvGrpSpPr/>
+          <p:nvPr/>
+        </p:nvGrpSpPr>
+        <p:grpSpPr>
+          <a:xfrm>
+            <a:off x="1828800" y="1219200"/>
+            <a:ext cx="3505200" cy="3505200"/>
+            <a:chOff x="1828800" y="1219200"/>
+            <a:chExt cx="3505200" cy="3505200"/>
+          </a:xfrm>
+        </p:grpSpPr>
+        <p:sp>
+          <p:nvSpPr>
+            <p:cNvPr id="4" name="Овал 3"/>
+            <p:cNvSpPr/>
+            <p:nvPr/>
+          </p:nvSpPr>
+          <p:spPr>
+            <a:xfrm>
+              <a:off x="1828800" y="1219200"/>
+              <a:ext cx="3505200" cy="3505200"/>
+            </a:xfrm>
+            <a:prstGeom prst="ellipse">
+              <a:avLst/>
+            </a:prstGeom>
+            <a:solidFill>
+              <a:schemeClr val="accent2">
+                <a:lumMod val="60000"/>
+                <a:lumOff val="40000"/>
+                <a:alpha val="49000"/>
+              </a:schemeClr>
+            </a:solidFill>
+          </p:spPr>
+          <p:style>
+            <a:lnRef idx="1">
+              <a:schemeClr val="dk1"/>
+            </a:lnRef>
+            <a:fillRef idx="2">
+              <a:schemeClr val="dk1"/>
+            </a:fillRef>
+            <a:effectRef idx="1">
+              <a:schemeClr val="dk1"/>
+            </a:effectRef>
+            <a:fontRef idx="minor">
+              <a:schemeClr val="dk1"/>
+            </a:fontRef>
+          </p:style>
+          <p:txBody>
+            <a:bodyPr rtlCol="0" anchor="ctr"/>
+            <a:lstStyle/>
+            <a:p>
+              <a:pPr algn="ctr"/>
+              <a:endParaRPr lang="ru-RU"/>
+            </a:p>
+          </p:txBody>
+        </p:sp>
+        <p:sp>
+          <p:nvSpPr>
+            <p:cNvPr id="10" name="TextBox 9"/>
+            <p:cNvSpPr txBox="1"/>
+            <p:nvPr/>
+          </p:nvSpPr>
+          <p:spPr>
+            <a:xfrm>
+              <a:off x="2362200" y="2057400"/>
+              <a:ext cx="1447800" cy="1384995"/>
+            </a:xfrm>
+            <a:prstGeom prst="rect">
+              <a:avLst/>
+            </a:prstGeom>
+            <a:noFill/>
+          </p:spPr>
+          <p:txBody>
+            <a:bodyPr wrap="square" rtlCol="0">
+              <a:spAutoFit/>
+            </a:bodyPr>
+            <a:lstStyle/>
+            <a:p>
+              <a:pPr algn="ctr"/>
+              <a:r>
+                <a:rPr lang="ru-RU" sz="2800" b="1" dirty="0" smtClean="0"/>
+                <a:t>База</a:t>
+              </a:r>
+            </a:p>
+            <a:p>
+              <a:pPr algn="ctr"/>
+              <a:r>
+                <a:rPr lang="ru-RU" sz="2800" b="1" dirty="0" smtClean="0"/>
+                <a:t>Данных</a:t>
+              </a:r>
+            </a:p>
+            <a:p>
+              <a:pPr algn="ctr"/>
+              <a:r>
+                <a:rPr lang="ru-RU" sz="2800" b="1" dirty="0" smtClean="0"/>
+                <a:t>№1</a:t>
+              </a:r>
+              <a:endParaRPr lang="ru-RU" sz="2800" b="1" dirty="0"/>
+            </a:p>
+          </p:txBody>
+        </p:sp>
+      </p:grpSp>
+      <p:grpSp>
+        <p:nvGrpSpPr>
+          <p:cNvPr id="14" name="Группа 13"/>
+          <p:cNvGrpSpPr/>
+          <p:nvPr/>
+        </p:nvGrpSpPr>
+        <p:grpSpPr>
+          <a:xfrm>
+            <a:off x="2895600" y="3200400"/>
+            <a:ext cx="3505200" cy="3505200"/>
+            <a:chOff x="2895600" y="3200400"/>
+            <a:chExt cx="3505200" cy="3505200"/>
+          </a:xfrm>
+        </p:grpSpPr>
+        <p:sp>
+          <p:nvSpPr>
+            <p:cNvPr id="6" name="Овал 5"/>
+            <p:cNvSpPr/>
+            <p:nvPr/>
+          </p:nvSpPr>
+          <p:spPr>
+            <a:xfrm>
+              <a:off x="2895600" y="3200400"/>
+              <a:ext cx="3505200" cy="3505200"/>
+            </a:xfrm>
+            <a:prstGeom prst="ellipse">
+              <a:avLst/>
+            </a:prstGeom>
+            <a:solidFill>
+              <a:schemeClr val="accent3">
+                <a:lumMod val="60000"/>
+                <a:lumOff val="40000"/>
+                <a:alpha val="60000"/>
+              </a:schemeClr>
+            </a:solidFill>
+          </p:spPr>
+          <p:style>
+            <a:lnRef idx="1">
+              <a:schemeClr val="accent5"/>
+            </a:lnRef>
+            <a:fillRef idx="2">
+              <a:schemeClr val="accent5"/>
+            </a:fillRef>
+            <a:effectRef idx="1">
+              <a:schemeClr val="accent5"/>
+            </a:effectRef>
+            <a:fontRef idx="minor">
+              <a:schemeClr val="dk1"/>
+            </a:fontRef>
+          </p:style>
+          <p:txBody>
+            <a:bodyPr rtlCol="0" anchor="ctr"/>
+            <a:lstStyle/>
+            <a:p>
+              <a:pPr algn="ctr"/>
+              <a:endParaRPr lang="ru-RU"/>
+            </a:p>
+          </p:txBody>
+        </p:sp>
+        <p:sp>
+          <p:nvSpPr>
+            <p:cNvPr id="11" name="TextBox 10"/>
+            <p:cNvSpPr txBox="1"/>
+            <p:nvPr/>
+          </p:nvSpPr>
+          <p:spPr>
+            <a:xfrm>
+              <a:off x="3962400" y="4876800"/>
+              <a:ext cx="1447800" cy="1384995"/>
+            </a:xfrm>
+            <a:prstGeom prst="rect">
+              <a:avLst/>
+            </a:prstGeom>
+            <a:noFill/>
+          </p:spPr>
+          <p:txBody>
+            <a:bodyPr wrap="square" rtlCol="0">
+              <a:spAutoFit/>
+            </a:bodyPr>
+            <a:lstStyle/>
+            <a:p>
+              <a:pPr algn="ctr"/>
+              <a:r>
+                <a:rPr lang="ru-RU" sz="2800" b="1" dirty="0" smtClean="0"/>
+                <a:t>База</a:t>
+              </a:r>
+            </a:p>
+            <a:p>
+              <a:pPr algn="ctr"/>
+              <a:r>
+                <a:rPr lang="ru-RU" sz="2800" b="1" dirty="0" smtClean="0"/>
+                <a:t>Данных</a:t>
+              </a:r>
+            </a:p>
+            <a:p>
+              <a:pPr algn="ctr"/>
+              <a:r>
+                <a:rPr lang="ru-RU" sz="2800" b="1" dirty="0" smtClean="0"/>
+                <a:t>№3</a:t>
+              </a:r>
+              <a:endParaRPr lang="ru-RU" sz="2800" b="1" dirty="0"/>
+            </a:p>
+          </p:txBody>
+        </p:sp>
+      </p:grpSp>
     </p:spTree>
   </p:cSld>
   <p:clrMapOvr>
     <a:masterClrMapping/>
   </p:clrMapOvr>
+  <p:timing>
+    <p:tnLst>
+      <p:par>
+        <p:cTn id="1" dur="indefinite" restart="never" nodeType="tmRoot">
+          <p:childTnLst>
+            <p:seq concurrent="1" nextAc="seek">
+              <p:cTn id="2" dur="indefinite" nodeType="mainSeq">
+                <p:childTnLst>
+                  <p:par>
+                    <p:cTn id="3" fill="hold">
+                      <p:stCondLst>
+                        <p:cond delay="indefinite"/>
+                      </p:stCondLst>
+                      <p:childTnLst>
+                        <p:par>
+                          <p:cTn id="4" fill="hold">
+                            <p:stCondLst>
+                              <p:cond delay="0"/>
+                            </p:stCondLst>
+                            <p:childTnLst>
+                              <p:par>
+                                <p:cTn id="5" presetID="53" presetClass="entr" presetSubtype="0" fill="hold" nodeType="clickEffect">
+                                  <p:stCondLst>
+                                    <p:cond delay="0"/>
+                                  </p:stCondLst>
+                                  <p:childTnLst>
+                                    <p:set>
+                                      <p:cBhvr>
+                                        <p:cTn id="6" dur="1" fill="hold">
+                                          <p:stCondLst>
+                                            <p:cond delay="0"/>
+                                          </p:stCondLst>
+                                        </p:cTn>
+                                        <p:tgtEl>
+                                          <p:spTgt spid="12"/>
+                                        </p:tgtEl>
+                                        <p:attrNameLst>
+                                          <p:attrName>style.visibility</p:attrName>
+                                        </p:attrNameLst>
+                                      </p:cBhvr>
+                                      <p:to>
+                                        <p:strVal val="visible"/>
+                                      </p:to>
+                                    </p:set>
+                                    <p:anim calcmode="lin" valueType="num">
+                                      <p:cBhvr>
+                                        <p:cTn id="7" dur="500" fill="hold"/>
+                                        <p:tgtEl>
+                                          <p:spTgt spid="12"/>
+                                        </p:tgtEl>
+                                        <p:attrNameLst>
+                                          <p:attrName>ppt_w</p:attrName>
+                                        </p:attrNameLst>
+                                      </p:cBhvr>
+                                      <p:tavLst>
+                                        <p:tav tm="0">
+                                          <p:val>
+                                            <p:fltVal val="0"/>
+                                          </p:val>
+                                        </p:tav>
+                                        <p:tav tm="100000">
+                                          <p:val>
+                                            <p:strVal val="#ppt_w"/>
+                                          </p:val>
+                                        </p:tav>
+                                      </p:tavLst>
+                                    </p:anim>
+                                    <p:anim calcmode="lin" valueType="num">
+                                      <p:cBhvr>
+                                        <p:cTn id="8" dur="500" fill="hold"/>
+                                        <p:tgtEl>
+                                          <p:spTgt spid="12"/>
+                                        </p:tgtEl>
+                                        <p:attrNameLst>
+                                          <p:attrName>ppt_h</p:attrName>
+                                        </p:attrNameLst>
+                                      </p:cBhvr>
+                                      <p:tavLst>
+                                        <p:tav tm="0">
+                                          <p:val>
+                                            <p:fltVal val="0"/>
+                                          </p:val>
+                                        </p:tav>
+                                        <p:tav tm="100000">
+                                          <p:val>
+                                            <p:strVal val="#ppt_h"/>
+                                          </p:val>
+                                        </p:tav>
+                                      </p:tavLst>
+                                    </p:anim>
+                                    <p:animEffect transition="in" filter="fade">
+                                      <p:cBhvr>
+                                        <p:cTn id="9" dur="500"/>
+                                        <p:tgtEl>
+                                          <p:spTgt spid="12"/>
+                                        </p:tgtEl>
+                                      </p:cBhvr>
+                                    </p:animEffect>
+                                  </p:childTnLst>
+                                </p:cTn>
+                              </p:par>
+                            </p:childTnLst>
+                          </p:cTn>
+                        </p:par>
+                      </p:childTnLst>
+                    </p:cTn>
+                  </p:par>
+                  <p:par>
+                    <p:cTn id="10" fill="hold">
+                      <p:stCondLst>
+                        <p:cond delay="indefinite"/>
+                      </p:stCondLst>
+                      <p:childTnLst>
+                        <p:par>
+                          <p:cTn id="11" fill="hold">
+                            <p:stCondLst>
+                              <p:cond delay="0"/>
+                            </p:stCondLst>
+                            <p:childTnLst>
+                              <p:par>
+                                <p:cTn id="12" presetID="53" presetClass="entr" presetSubtype="0" fill="hold" nodeType="clickEffect">
+                                  <p:stCondLst>
+                                    <p:cond delay="0"/>
+                                  </p:stCondLst>
+                                  <p:childTnLst>
+                                    <p:set>
+                                      <p:cBhvr>
+                                        <p:cTn id="13" dur="1" fill="hold">
+                                          <p:stCondLst>
+                                            <p:cond delay="0"/>
+                                          </p:stCondLst>
+                                        </p:cTn>
+                                        <p:tgtEl>
+                                          <p:spTgt spid="13"/>
+                                        </p:tgtEl>
+                                        <p:attrNameLst>
+                                          <p:attrName>style.visibility</p:attrName>
+                                        </p:attrNameLst>
+                                      </p:cBhvr>
+                                      <p:to>
+                                        <p:strVal val="visible"/>
+                                      </p:to>
+                                    </p:set>
+                                    <p:anim calcmode="lin" valueType="num">
+                                      <p:cBhvr>
+                                        <p:cTn id="14" dur="500" fill="hold"/>
+                                        <p:tgtEl>
+                                          <p:spTgt spid="13"/>
+                                        </p:tgtEl>
+                                        <p:attrNameLst>
+                                          <p:attrName>ppt_w</p:attrName>
+                                        </p:attrNameLst>
+                                      </p:cBhvr>
+                                      <p:tavLst>
+                                        <p:tav tm="0">
+                                          <p:val>
+                                            <p:fltVal val="0"/>
+                                          </p:val>
+                                        </p:tav>
+                                        <p:tav tm="100000">
+                                          <p:val>
+                                            <p:strVal val="#ppt_w"/>
+                                          </p:val>
+                                        </p:tav>
+                                      </p:tavLst>
+                                    </p:anim>
+                                    <p:anim calcmode="lin" valueType="num">
+                                      <p:cBhvr>
+                                        <p:cTn id="15" dur="500" fill="hold"/>
+                                        <p:tgtEl>
+                                          <p:spTgt spid="13"/>
+                                        </p:tgtEl>
+                                        <p:attrNameLst>
+                                          <p:attrName>ppt_h</p:attrName>
+                                        </p:attrNameLst>
+                                      </p:cBhvr>
+                                      <p:tavLst>
+                                        <p:tav tm="0">
+                                          <p:val>
+                                            <p:fltVal val="0"/>
+                                          </p:val>
+                                        </p:tav>
+                                        <p:tav tm="100000">
+                                          <p:val>
+                                            <p:strVal val="#ppt_h"/>
+                                          </p:val>
+                                        </p:tav>
+                                      </p:tavLst>
+                                    </p:anim>
+                                    <p:animEffect transition="in" filter="fade">
+                                      <p:cBhvr>
+                                        <p:cTn id="16" dur="500"/>
+                                        <p:tgtEl>
+                                          <p:spTgt spid="13"/>
+                                        </p:tgtEl>
+                                      </p:cBhvr>
+                                    </p:animEffect>
+                                  </p:childTnLst>
+                                </p:cTn>
+                              </p:par>
+                            </p:childTnLst>
+                          </p:cTn>
+                        </p:par>
+                      </p:childTnLst>
+                    </p:cTn>
+                  </p:par>
+                  <p:par>
+                    <p:cTn id="17" fill="hold">
+                      <p:stCondLst>
+                        <p:cond delay="indefinite"/>
+                      </p:stCondLst>
+                      <p:childTnLst>
+                        <p:par>
+                          <p:cTn id="18" fill="hold">
+                            <p:stCondLst>
+                              <p:cond delay="0"/>
+                            </p:stCondLst>
+                            <p:childTnLst>
+                              <p:par>
+                                <p:cTn id="19" presetID="53" presetClass="entr" presetSubtype="0" fill="hold" nodeType="clickEffect">
+                                  <p:stCondLst>
+                                    <p:cond delay="0"/>
+                                  </p:stCondLst>
+                                  <p:childTnLst>
+                                    <p:set>
+                                      <p:cBhvr>
+                                        <p:cTn id="20" dur="1" fill="hold">
+                                          <p:stCondLst>
+                                            <p:cond delay="0"/>
+                                          </p:stCondLst>
+                                        </p:cTn>
+                                        <p:tgtEl>
+                                          <p:spTgt spid="14"/>
+                                        </p:tgtEl>
+                                        <p:attrNameLst>
+                                          <p:attrName>style.visibility</p:attrName>
+                                        </p:attrNameLst>
+                                      </p:cBhvr>
+                                      <p:to>
+                                        <p:strVal val="visible"/>
+                                      </p:to>
+                                    </p:set>
+                                    <p:anim calcmode="lin" valueType="num">
+                                      <p:cBhvr>
+                                        <p:cTn id="21" dur="500" fill="hold"/>
+                                        <p:tgtEl>
+                                          <p:spTgt spid="14"/>
+                                        </p:tgtEl>
+                                        <p:attrNameLst>
+                                          <p:attrName>ppt_w</p:attrName>
+                                        </p:attrNameLst>
+                                      </p:cBhvr>
+                                      <p:tavLst>
+                                        <p:tav tm="0">
+                                          <p:val>
+                                            <p:fltVal val="0"/>
+                                          </p:val>
+                                        </p:tav>
+                                        <p:tav tm="100000">
+                                          <p:val>
+                                            <p:strVal val="#ppt_w"/>
+                                          </p:val>
+                                        </p:tav>
+                                      </p:tavLst>
+                                    </p:anim>
+                                    <p:anim calcmode="lin" valueType="num">
+                                      <p:cBhvr>
+                                        <p:cTn id="22" dur="500" fill="hold"/>
+                                        <p:tgtEl>
+                                          <p:spTgt spid="14"/>
+                                        </p:tgtEl>
+                                        <p:attrNameLst>
+                                          <p:attrName>ppt_h</p:attrName>
+                                        </p:attrNameLst>
+                                      </p:cBhvr>
+                                      <p:tavLst>
+                                        <p:tav tm="0">
+                                          <p:val>
+                                            <p:fltVal val="0"/>
+                                          </p:val>
+                                        </p:tav>
+                                        <p:tav tm="100000">
+                                          <p:val>
+                                            <p:strVal val="#ppt_h"/>
+                                          </p:val>
+                                        </p:tav>
+                                      </p:tavLst>
+                                    </p:anim>
+                                    <p:animEffect transition="in" filter="fade">
+                                      <p:cBhvr>
+                                        <p:cTn id="23" dur="500"/>
+                                        <p:tgtEl>
+                                          <p:spTgt spid="14"/>
+                                        </p:tgtEl>
+                                      </p:cBhvr>
+                                    </p:animEffect>
+                                  </p:childTnLst>
+                                </p:cTn>
+                              </p:par>
+                            </p:childTnLst>
+                          </p:cTn>
+                        </p:par>
+                      </p:childTnLst>
+                    </p:cTn>
+                  </p:par>
+                </p:childTnLst>
+              </p:cTn>
+              <p:prevCondLst>
+                <p:cond evt="onPrev" delay="0">
+                  <p:tgtEl>
+                    <p:sldTgt/>
+                  </p:tgtEl>
+                </p:cond>
+              </p:prevCondLst>
+              <p:nextCondLst>
+                <p:cond evt="onNext" delay="0">
+                  <p:tgtEl>
+                    <p:sldTgt/>
+                  </p:tgtEl>
+                </p:cond>
+              </p:nextCondLst>
+            </p:seq>
+          </p:childTnLst>
+        </p:cTn>
+      </p:par>
+    </p:tnLst>
+  </p:timing>
 </p:sld>
 </file>
 

</xml_diff>

<commit_message>
diploma. presentation application structure
</commit_message>
<xml_diff>
--- a/Semantic Presentation.pptx
+++ b/Semantic Presentation.pptx
@@ -264,7 +264,7 @@
             <a:fld id="{7EAF463A-BC7C-46EE-9F1E-7F377CCA4891}" type="datetimeFigureOut">
               <a:rPr lang="en-US" smtClean="0"/>
               <a:pPr/>
-              <a:t>6/1/2015</a:t>
+              <a:t>6/3/2015</a:t>
             </a:fld>
             <a:endParaRPr lang="en-US" dirty="0"/>
           </a:p>
@@ -625,7 +625,7 @@
             <a:fld id="{7EAF463A-BC7C-46EE-9F1E-7F377CCA4891}" type="datetimeFigureOut">
               <a:rPr lang="en-US" smtClean="0"/>
               <a:pPr/>
-              <a:t>6/1/2015</a:t>
+              <a:t>6/3/2015</a:t>
             </a:fld>
             <a:endParaRPr lang="en-US" dirty="0"/>
           </a:p>
@@ -802,7 +802,7 @@
             <a:fld id="{7EAF463A-BC7C-46EE-9F1E-7F377CCA4891}" type="datetimeFigureOut">
               <a:rPr lang="en-US" smtClean="0"/>
               <a:pPr/>
-              <a:t>6/1/2015</a:t>
+              <a:t>6/3/2015</a:t>
             </a:fld>
             <a:endParaRPr lang="en-US" dirty="0"/>
           </a:p>
@@ -1039,7 +1039,7 @@
             <a:fld id="{7EAF463A-BC7C-46EE-9F1E-7F377CCA4891}" type="datetimeFigureOut">
               <a:rPr lang="en-US" smtClean="0"/>
               <a:pPr/>
-              <a:t>6/1/2015</a:t>
+              <a:t>6/3/2015</a:t>
             </a:fld>
             <a:endParaRPr lang="en-US" dirty="0"/>
           </a:p>
@@ -1310,7 +1310,7 @@
             <a:fld id="{7EAF463A-BC7C-46EE-9F1E-7F377CCA4891}" type="datetimeFigureOut">
               <a:rPr lang="en-US" smtClean="0"/>
               <a:pPr/>
-              <a:t>6/1/2015</a:t>
+              <a:t>6/3/2015</a:t>
             </a:fld>
             <a:endParaRPr lang="en-US" dirty="0"/>
           </a:p>
@@ -1532,7 +1532,7 @@
             <a:fld id="{7EAF463A-BC7C-46EE-9F1E-7F377CCA4891}" type="datetimeFigureOut">
               <a:rPr lang="en-US" smtClean="0"/>
               <a:pPr/>
-              <a:t>6/1/2015</a:t>
+              <a:t>6/3/2015</a:t>
             </a:fld>
             <a:endParaRPr lang="en-US" dirty="0"/>
           </a:p>
@@ -1886,7 +1886,7 @@
             <a:fld id="{7EAF463A-BC7C-46EE-9F1E-7F377CCA4891}" type="datetimeFigureOut">
               <a:rPr lang="en-US" smtClean="0"/>
               <a:pPr/>
-              <a:t>6/1/2015</a:t>
+              <a:t>6/3/2015</a:t>
             </a:fld>
             <a:endParaRPr lang="en-US" dirty="0"/>
           </a:p>
@@ -2120,7 +2120,7 @@
             <a:fld id="{7EAF463A-BC7C-46EE-9F1E-7F377CCA4891}" type="datetimeFigureOut">
               <a:rPr lang="en-US" smtClean="0"/>
               <a:pPr/>
-              <a:t>6/1/2015</a:t>
+              <a:t>6/3/2015</a:t>
             </a:fld>
             <a:endParaRPr lang="en-US" dirty="0"/>
           </a:p>
@@ -2262,7 +2262,7 @@
             <a:fld id="{7EAF463A-BC7C-46EE-9F1E-7F377CCA4891}" type="datetimeFigureOut">
               <a:rPr lang="en-US" smtClean="0"/>
               <a:pPr/>
-              <a:t>6/1/2015</a:t>
+              <a:t>6/3/2015</a:t>
             </a:fld>
             <a:endParaRPr lang="en-US" dirty="0"/>
           </a:p>
@@ -2541,7 +2541,7 @@
             <a:fld id="{7EAF463A-BC7C-46EE-9F1E-7F377CCA4891}" type="datetimeFigureOut">
               <a:rPr lang="en-US" smtClean="0"/>
               <a:pPr/>
-              <a:t>6/1/2015</a:t>
+              <a:t>6/3/2015</a:t>
             </a:fld>
             <a:endParaRPr lang="en-US" dirty="0"/>
           </a:p>
@@ -2950,7 +2950,7 @@
             <a:fld id="{7EAF463A-BC7C-46EE-9F1E-7F377CCA4891}" type="datetimeFigureOut">
               <a:rPr lang="en-US" smtClean="0"/>
               <a:pPr/>
-              <a:t>6/1/2015</a:t>
+              <a:t>6/3/2015</a:t>
             </a:fld>
             <a:endParaRPr lang="en-US" dirty="0"/>
           </a:p>
@@ -3290,7 +3290,7 @@
             <a:fld id="{7EAF463A-BC7C-46EE-9F1E-7F377CCA4891}" type="datetimeFigureOut">
               <a:rPr lang="en-US" smtClean="0"/>
               <a:pPr/>
-              <a:t>6/1/2015</a:t>
+              <a:t>6/3/2015</a:t>
             </a:fld>
             <a:endParaRPr lang="en-US" dirty="0"/>
           </a:p>
@@ -5143,23 +5143,1309 @@
       </p:sp>
       <p:sp>
         <p:nvSpPr>
-          <p:cNvPr id="3" name="Содержимое 2"/>
-          <p:cNvSpPr>
-            <a:spLocks noGrp="1"/>
-          </p:cNvSpPr>
-          <p:nvPr>
-            <p:ph sz="quarter" idx="1"/>
-          </p:nvPr>
-        </p:nvSpPr>
-        <p:spPr/>
-        <p:txBody>
-          <a:bodyPr/>
-          <a:lstStyle/>
-          <a:p>
+          <p:cNvPr id="4" name="Овал 3"/>
+          <p:cNvSpPr/>
+          <p:nvPr/>
+        </p:nvSpPr>
+        <p:spPr>
+          <a:xfrm>
+            <a:off x="3659912" y="1420092"/>
+            <a:ext cx="2209800" cy="1981200"/>
+          </a:xfrm>
+          <a:prstGeom prst="ellipse">
+            <a:avLst/>
+          </a:prstGeom>
+        </p:spPr>
+        <p:style>
+          <a:lnRef idx="2">
+            <a:schemeClr val="accent1">
+              <a:shade val="50000"/>
+            </a:schemeClr>
+          </a:lnRef>
+          <a:fillRef idx="1">
+            <a:schemeClr val="accent1"/>
+          </a:fillRef>
+          <a:effectRef idx="0">
+            <a:schemeClr val="accent1"/>
+          </a:effectRef>
+          <a:fontRef idx="minor">
+            <a:schemeClr val="lt1"/>
+          </a:fontRef>
+        </p:style>
+        <p:txBody>
+          <a:bodyPr rtlCol="0" anchor="ctr"/>
+          <a:lstStyle/>
+          <a:p>
+            <a:pPr algn="ctr"/>
+            <a:r>
+              <a:rPr lang="ru-RU" dirty="0" smtClean="0"/>
+              <a:t>Приложение</a:t>
+            </a:r>
+          </a:p>
+          <a:p>
+            <a:pPr algn="ctr"/>
+            <a:r>
+              <a:rPr lang="en-US" dirty="0" smtClean="0"/>
+              <a:t>semantic</a:t>
+            </a:r>
             <a:endParaRPr lang="ru-RU" dirty="0"/>
           </a:p>
         </p:txBody>
       </p:sp>
+      <p:grpSp>
+        <p:nvGrpSpPr>
+          <p:cNvPr id="7" name="Группа 6"/>
+          <p:cNvGrpSpPr/>
+          <p:nvPr/>
+        </p:nvGrpSpPr>
+        <p:grpSpPr>
+          <a:xfrm>
+            <a:off x="609600" y="1295400"/>
+            <a:ext cx="1752600" cy="1905000"/>
+            <a:chOff x="609600" y="1295400"/>
+            <a:chExt cx="1752600" cy="1905000"/>
+          </a:xfrm>
+        </p:grpSpPr>
+        <p:sp>
+          <p:nvSpPr>
+            <p:cNvPr id="5" name="Блок-схема: магнитный диск 4"/>
+            <p:cNvSpPr/>
+            <p:nvPr/>
+          </p:nvSpPr>
+          <p:spPr>
+            <a:xfrm>
+              <a:off x="609600" y="1295400"/>
+              <a:ext cx="1752600" cy="1905000"/>
+            </a:xfrm>
+            <a:prstGeom prst="flowChartMagneticDisk">
+              <a:avLst/>
+            </a:prstGeom>
+          </p:spPr>
+          <p:style>
+            <a:lnRef idx="2">
+              <a:schemeClr val="accent1">
+                <a:shade val="50000"/>
+              </a:schemeClr>
+            </a:lnRef>
+            <a:fillRef idx="1">
+              <a:schemeClr val="accent1"/>
+            </a:fillRef>
+            <a:effectRef idx="0">
+              <a:schemeClr val="accent1"/>
+            </a:effectRef>
+            <a:fontRef idx="minor">
+              <a:schemeClr val="lt1"/>
+            </a:fontRef>
+          </p:style>
+          <p:txBody>
+            <a:bodyPr rtlCol="0" anchor="ctr"/>
+            <a:lstStyle/>
+            <a:p>
+              <a:pPr algn="ctr"/>
+              <a:r>
+                <a:rPr lang="ru-RU" dirty="0" smtClean="0"/>
+                <a:t>Семантическая база данных (граф)</a:t>
+              </a:r>
+              <a:endParaRPr lang="ru-RU" dirty="0"/>
+            </a:p>
+          </p:txBody>
+        </p:sp>
+        <p:sp>
+          <p:nvSpPr>
+            <p:cNvPr id="6" name="Овал 5"/>
+            <p:cNvSpPr/>
+            <p:nvPr/>
+          </p:nvSpPr>
+          <p:spPr>
+            <a:xfrm>
+              <a:off x="762000" y="1394692"/>
+              <a:ext cx="1447800" cy="431800"/>
+            </a:xfrm>
+            <a:prstGeom prst="ellipse">
+              <a:avLst/>
+            </a:prstGeom>
+          </p:spPr>
+          <p:style>
+            <a:lnRef idx="2">
+              <a:schemeClr val="accent3">
+                <a:shade val="50000"/>
+              </a:schemeClr>
+            </a:lnRef>
+            <a:fillRef idx="1">
+              <a:schemeClr val="accent3"/>
+            </a:fillRef>
+            <a:effectRef idx="0">
+              <a:schemeClr val="accent3"/>
+            </a:effectRef>
+            <a:fontRef idx="minor">
+              <a:schemeClr val="lt1"/>
+            </a:fontRef>
+          </p:style>
+          <p:txBody>
+            <a:bodyPr rtlCol="0" anchor="ctr"/>
+            <a:lstStyle/>
+            <a:p>
+              <a:pPr algn="ctr"/>
+              <a:endParaRPr lang="ru-RU"/>
+            </a:p>
+          </p:txBody>
+        </p:sp>
+      </p:grpSp>
+      <p:cxnSp>
+        <p:nvCxnSpPr>
+          <p:cNvPr id="9" name="Прямая со стрелкой 8"/>
+          <p:cNvCxnSpPr/>
+          <p:nvPr/>
+        </p:nvCxnSpPr>
+        <p:spPr>
+          <a:xfrm flipV="1">
+            <a:off x="2438400" y="2209800"/>
+            <a:ext cx="1143000" cy="304800"/>
+          </a:xfrm>
+          <a:prstGeom prst="straightConnector1">
+            <a:avLst/>
+          </a:prstGeom>
+          <a:ln>
+            <a:prstDash val="dash"/>
+            <a:tailEnd type="arrow"/>
+          </a:ln>
+        </p:spPr>
+        <p:style>
+          <a:lnRef idx="3">
+            <a:schemeClr val="accent2"/>
+          </a:lnRef>
+          <a:fillRef idx="0">
+            <a:schemeClr val="accent2"/>
+          </a:fillRef>
+          <a:effectRef idx="2">
+            <a:schemeClr val="accent2"/>
+          </a:effectRef>
+          <a:fontRef idx="minor">
+            <a:schemeClr val="tx1"/>
+          </a:fontRef>
+        </p:style>
+      </p:cxnSp>
+      <p:cxnSp>
+        <p:nvCxnSpPr>
+          <p:cNvPr id="10" name="Прямая со стрелкой 9"/>
+          <p:cNvCxnSpPr/>
+          <p:nvPr/>
+        </p:nvCxnSpPr>
+        <p:spPr>
+          <a:xfrm rot="10800000" flipV="1">
+            <a:off x="2438400" y="2438400"/>
+            <a:ext cx="1143000" cy="304800"/>
+          </a:xfrm>
+          <a:prstGeom prst="straightConnector1">
+            <a:avLst/>
+          </a:prstGeom>
+          <a:ln>
+            <a:prstDash val="dash"/>
+            <a:tailEnd type="arrow"/>
+          </a:ln>
+        </p:spPr>
+        <p:style>
+          <a:lnRef idx="3">
+            <a:schemeClr val="accent2"/>
+          </a:lnRef>
+          <a:fillRef idx="0">
+            <a:schemeClr val="accent2"/>
+          </a:fillRef>
+          <a:effectRef idx="2">
+            <a:schemeClr val="accent2"/>
+          </a:effectRef>
+          <a:fontRef idx="minor">
+            <a:schemeClr val="tx1"/>
+          </a:fontRef>
+        </p:style>
+      </p:cxnSp>
+      <p:grpSp>
+        <p:nvGrpSpPr>
+          <p:cNvPr id="21" name="Группа 20"/>
+          <p:cNvGrpSpPr/>
+          <p:nvPr/>
+        </p:nvGrpSpPr>
+        <p:grpSpPr>
+          <a:xfrm>
+            <a:off x="457200" y="4114800"/>
+            <a:ext cx="1371600" cy="1905000"/>
+            <a:chOff x="1905000" y="4114800"/>
+            <a:chExt cx="1371600" cy="1905000"/>
+          </a:xfrm>
+        </p:grpSpPr>
+        <p:sp>
+          <p:nvSpPr>
+            <p:cNvPr id="17" name="Прямоугольник 16"/>
+            <p:cNvSpPr/>
+            <p:nvPr/>
+          </p:nvSpPr>
+          <p:spPr>
+            <a:xfrm>
+              <a:off x="1905000" y="5257800"/>
+              <a:ext cx="1371600" cy="762000"/>
+            </a:xfrm>
+            <a:prstGeom prst="rect">
+              <a:avLst/>
+            </a:prstGeom>
+            <a:solidFill>
+              <a:srgbClr val="216A97"/>
+            </a:solidFill>
+          </p:spPr>
+          <p:style>
+            <a:lnRef idx="2">
+              <a:schemeClr val="accent3">
+                <a:shade val="50000"/>
+              </a:schemeClr>
+            </a:lnRef>
+            <a:fillRef idx="1">
+              <a:schemeClr val="accent3"/>
+            </a:fillRef>
+            <a:effectRef idx="0">
+              <a:schemeClr val="accent3"/>
+            </a:effectRef>
+            <a:fontRef idx="minor">
+              <a:schemeClr val="lt1"/>
+            </a:fontRef>
+          </p:style>
+          <p:txBody>
+            <a:bodyPr rtlCol="0" anchor="ctr"/>
+            <a:lstStyle/>
+            <a:p>
+              <a:pPr algn="ctr"/>
+              <a:r>
+                <a:rPr lang="ru-RU" dirty="0" smtClean="0"/>
+                <a:t>Файл </a:t>
+              </a:r>
+              <a:r>
+                <a:rPr lang="en-US" dirty="0" err="1" smtClean="0">
+                  <a:solidFill>
+                    <a:schemeClr val="accent2">
+                      <a:lumMod val="50000"/>
+                    </a:schemeClr>
+                  </a:solidFill>
+                </a:rPr>
+                <a:t>docx</a:t>
+              </a:r>
+              <a:endParaRPr lang="ru-RU" dirty="0">
+                <a:solidFill>
+                  <a:schemeClr val="accent2">
+                    <a:lumMod val="50000"/>
+                  </a:schemeClr>
+                </a:solidFill>
+              </a:endParaRPr>
+            </a:p>
+          </p:txBody>
+        </p:sp>
+        <p:sp>
+          <p:nvSpPr>
+            <p:cNvPr id="18" name="Скругленный прямоугольник 17"/>
+            <p:cNvSpPr/>
+            <p:nvPr/>
+          </p:nvSpPr>
+          <p:spPr>
+            <a:xfrm>
+              <a:off x="1905000" y="4114800"/>
+              <a:ext cx="1371600" cy="685800"/>
+            </a:xfrm>
+            <a:prstGeom prst="roundRect">
+              <a:avLst>
+                <a:gd name="adj" fmla="val 24748"/>
+              </a:avLst>
+            </a:prstGeom>
+          </p:spPr>
+          <p:style>
+            <a:lnRef idx="2">
+              <a:schemeClr val="accent1">
+                <a:shade val="50000"/>
+              </a:schemeClr>
+            </a:lnRef>
+            <a:fillRef idx="1">
+              <a:schemeClr val="accent1"/>
+            </a:fillRef>
+            <a:effectRef idx="0">
+              <a:schemeClr val="accent1"/>
+            </a:effectRef>
+            <a:fontRef idx="minor">
+              <a:schemeClr val="lt1"/>
+            </a:fontRef>
+          </p:style>
+          <p:txBody>
+            <a:bodyPr rtlCol="0" anchor="ctr"/>
+            <a:lstStyle/>
+            <a:p>
+              <a:pPr algn="ctr"/>
+              <a:r>
+                <a:rPr lang="ru-RU" dirty="0" smtClean="0"/>
+                <a:t>Адаптер </a:t>
+              </a:r>
+              <a:r>
+                <a:rPr lang="en-US" dirty="0" err="1" smtClean="0"/>
+                <a:t>docx</a:t>
+              </a:r>
+              <a:endParaRPr lang="ru-RU" dirty="0"/>
+            </a:p>
+          </p:txBody>
+        </p:sp>
+        <p:cxnSp>
+          <p:nvCxnSpPr>
+            <p:cNvPr id="20" name="Прямая со стрелкой 19"/>
+            <p:cNvCxnSpPr>
+              <a:stCxn id="17" idx="0"/>
+              <a:endCxn id="18" idx="2"/>
+            </p:cNvCxnSpPr>
+            <p:nvPr/>
+          </p:nvCxnSpPr>
+          <p:spPr>
+            <a:xfrm rot="5400000" flipH="1" flipV="1">
+              <a:off x="2362200" y="5029200"/>
+              <a:ext cx="457200" cy="1588"/>
+            </a:xfrm>
+            <a:prstGeom prst="straightConnector1">
+              <a:avLst/>
+            </a:prstGeom>
+            <a:ln w="38100">
+              <a:tailEnd type="arrow"/>
+            </a:ln>
+            <a:effectLst/>
+          </p:spPr>
+          <p:style>
+            <a:lnRef idx="2">
+              <a:schemeClr val="accent2"/>
+            </a:lnRef>
+            <a:fillRef idx="0">
+              <a:schemeClr val="accent2"/>
+            </a:fillRef>
+            <a:effectRef idx="1">
+              <a:schemeClr val="accent2"/>
+            </a:effectRef>
+            <a:fontRef idx="minor">
+              <a:schemeClr val="tx1"/>
+            </a:fontRef>
+          </p:style>
+        </p:cxnSp>
+      </p:grpSp>
+      <p:grpSp>
+        <p:nvGrpSpPr>
+          <p:cNvPr id="22" name="Группа 21"/>
+          <p:cNvGrpSpPr/>
+          <p:nvPr/>
+        </p:nvGrpSpPr>
+        <p:grpSpPr>
+          <a:xfrm>
+            <a:off x="2057400" y="4114800"/>
+            <a:ext cx="1371600" cy="1905000"/>
+            <a:chOff x="1905000" y="4114800"/>
+            <a:chExt cx="1371600" cy="1905000"/>
+          </a:xfrm>
+        </p:grpSpPr>
+        <p:sp>
+          <p:nvSpPr>
+            <p:cNvPr id="23" name="Прямоугольник 22"/>
+            <p:cNvSpPr/>
+            <p:nvPr/>
+          </p:nvSpPr>
+          <p:spPr>
+            <a:xfrm>
+              <a:off x="1905000" y="5257800"/>
+              <a:ext cx="1371600" cy="762000"/>
+            </a:xfrm>
+            <a:prstGeom prst="rect">
+              <a:avLst/>
+            </a:prstGeom>
+            <a:solidFill>
+              <a:srgbClr val="216A97"/>
+            </a:solidFill>
+          </p:spPr>
+          <p:style>
+            <a:lnRef idx="2">
+              <a:schemeClr val="accent3">
+                <a:shade val="50000"/>
+              </a:schemeClr>
+            </a:lnRef>
+            <a:fillRef idx="1">
+              <a:schemeClr val="accent3"/>
+            </a:fillRef>
+            <a:effectRef idx="0">
+              <a:schemeClr val="accent3"/>
+            </a:effectRef>
+            <a:fontRef idx="minor">
+              <a:schemeClr val="lt1"/>
+            </a:fontRef>
+          </p:style>
+          <p:txBody>
+            <a:bodyPr rtlCol="0" anchor="ctr"/>
+            <a:lstStyle/>
+            <a:p>
+              <a:pPr algn="ctr"/>
+              <a:r>
+                <a:rPr lang="ru-RU" dirty="0" smtClean="0"/>
+                <a:t>Файл </a:t>
+              </a:r>
+              <a:r>
+                <a:rPr lang="en-US" dirty="0" smtClean="0">
+                  <a:solidFill>
+                    <a:schemeClr val="accent2">
+                      <a:lumMod val="50000"/>
+                    </a:schemeClr>
+                  </a:solidFill>
+                </a:rPr>
+                <a:t>mp3</a:t>
+              </a:r>
+              <a:endParaRPr lang="ru-RU" dirty="0">
+                <a:solidFill>
+                  <a:schemeClr val="accent2">
+                    <a:lumMod val="50000"/>
+                  </a:schemeClr>
+                </a:solidFill>
+              </a:endParaRPr>
+            </a:p>
+          </p:txBody>
+        </p:sp>
+        <p:sp>
+          <p:nvSpPr>
+            <p:cNvPr id="24" name="Скругленный прямоугольник 23"/>
+            <p:cNvSpPr/>
+            <p:nvPr/>
+          </p:nvSpPr>
+          <p:spPr>
+            <a:xfrm>
+              <a:off x="1905000" y="4114800"/>
+              <a:ext cx="1371600" cy="685800"/>
+            </a:xfrm>
+            <a:prstGeom prst="roundRect">
+              <a:avLst>
+                <a:gd name="adj" fmla="val 24748"/>
+              </a:avLst>
+            </a:prstGeom>
+          </p:spPr>
+          <p:style>
+            <a:lnRef idx="2">
+              <a:schemeClr val="accent1">
+                <a:shade val="50000"/>
+              </a:schemeClr>
+            </a:lnRef>
+            <a:fillRef idx="1">
+              <a:schemeClr val="accent1"/>
+            </a:fillRef>
+            <a:effectRef idx="0">
+              <a:schemeClr val="accent1"/>
+            </a:effectRef>
+            <a:fontRef idx="minor">
+              <a:schemeClr val="lt1"/>
+            </a:fontRef>
+          </p:style>
+          <p:txBody>
+            <a:bodyPr rtlCol="0" anchor="ctr"/>
+            <a:lstStyle/>
+            <a:p>
+              <a:pPr algn="ctr"/>
+              <a:r>
+                <a:rPr lang="ru-RU" dirty="0" smtClean="0"/>
+                <a:t>Адаптер </a:t>
+              </a:r>
+              <a:r>
+                <a:rPr lang="en-US" dirty="0" smtClean="0"/>
+                <a:t>mp3</a:t>
+              </a:r>
+              <a:endParaRPr lang="ru-RU" dirty="0"/>
+            </a:p>
+          </p:txBody>
+        </p:sp>
+        <p:cxnSp>
+          <p:nvCxnSpPr>
+            <p:cNvPr id="25" name="Прямая со стрелкой 24"/>
+            <p:cNvCxnSpPr>
+              <a:stCxn id="23" idx="0"/>
+              <a:endCxn id="24" idx="2"/>
+            </p:cNvCxnSpPr>
+            <p:nvPr/>
+          </p:nvCxnSpPr>
+          <p:spPr>
+            <a:xfrm rot="5400000" flipH="1" flipV="1">
+              <a:off x="2362200" y="5029200"/>
+              <a:ext cx="457200" cy="1588"/>
+            </a:xfrm>
+            <a:prstGeom prst="straightConnector1">
+              <a:avLst/>
+            </a:prstGeom>
+            <a:ln w="38100">
+              <a:tailEnd type="arrow"/>
+            </a:ln>
+            <a:effectLst/>
+          </p:spPr>
+          <p:style>
+            <a:lnRef idx="2">
+              <a:schemeClr val="accent2"/>
+            </a:lnRef>
+            <a:fillRef idx="0">
+              <a:schemeClr val="accent2"/>
+            </a:fillRef>
+            <a:effectRef idx="1">
+              <a:schemeClr val="accent2"/>
+            </a:effectRef>
+            <a:fontRef idx="minor">
+              <a:schemeClr val="tx1"/>
+            </a:fontRef>
+          </p:style>
+        </p:cxnSp>
+      </p:grpSp>
+      <p:grpSp>
+        <p:nvGrpSpPr>
+          <p:cNvPr id="30" name="Группа 29"/>
+          <p:cNvGrpSpPr/>
+          <p:nvPr/>
+        </p:nvGrpSpPr>
+        <p:grpSpPr>
+          <a:xfrm>
+            <a:off x="3657600" y="4114800"/>
+            <a:ext cx="1371600" cy="1905000"/>
+            <a:chOff x="1905000" y="4114800"/>
+            <a:chExt cx="1371600" cy="1905000"/>
+          </a:xfrm>
+        </p:grpSpPr>
+        <p:sp>
+          <p:nvSpPr>
+            <p:cNvPr id="31" name="Прямоугольник 30"/>
+            <p:cNvSpPr/>
+            <p:nvPr/>
+          </p:nvSpPr>
+          <p:spPr>
+            <a:xfrm>
+              <a:off x="1905000" y="5257800"/>
+              <a:ext cx="1371600" cy="762000"/>
+            </a:xfrm>
+            <a:prstGeom prst="rect">
+              <a:avLst/>
+            </a:prstGeom>
+            <a:solidFill>
+              <a:srgbClr val="216A97"/>
+            </a:solidFill>
+          </p:spPr>
+          <p:style>
+            <a:lnRef idx="2">
+              <a:schemeClr val="accent3">
+                <a:shade val="50000"/>
+              </a:schemeClr>
+            </a:lnRef>
+            <a:fillRef idx="1">
+              <a:schemeClr val="accent3"/>
+            </a:fillRef>
+            <a:effectRef idx="0">
+              <a:schemeClr val="accent3"/>
+            </a:effectRef>
+            <a:fontRef idx="minor">
+              <a:schemeClr val="lt1"/>
+            </a:fontRef>
+          </p:style>
+          <p:txBody>
+            <a:bodyPr rtlCol="0" anchor="ctr"/>
+            <a:lstStyle/>
+            <a:p>
+              <a:pPr algn="ctr"/>
+              <a:r>
+                <a:rPr lang="ru-RU" dirty="0" smtClean="0"/>
+                <a:t>Файл </a:t>
+              </a:r>
+              <a:r>
+                <a:rPr lang="en-US" dirty="0" err="1" smtClean="0">
+                  <a:solidFill>
+                    <a:schemeClr val="accent2">
+                      <a:lumMod val="50000"/>
+                    </a:schemeClr>
+                  </a:solidFill>
+                </a:rPr>
+                <a:t>mbox</a:t>
+              </a:r>
+              <a:endParaRPr lang="ru-RU" dirty="0">
+                <a:solidFill>
+                  <a:schemeClr val="accent2">
+                    <a:lumMod val="50000"/>
+                  </a:schemeClr>
+                </a:solidFill>
+              </a:endParaRPr>
+            </a:p>
+          </p:txBody>
+        </p:sp>
+        <p:sp>
+          <p:nvSpPr>
+            <p:cNvPr id="32" name="Скругленный прямоугольник 31"/>
+            <p:cNvSpPr/>
+            <p:nvPr/>
+          </p:nvSpPr>
+          <p:spPr>
+            <a:xfrm>
+              <a:off x="1905000" y="4114800"/>
+              <a:ext cx="1371600" cy="685800"/>
+            </a:xfrm>
+            <a:prstGeom prst="roundRect">
+              <a:avLst>
+                <a:gd name="adj" fmla="val 24748"/>
+              </a:avLst>
+            </a:prstGeom>
+          </p:spPr>
+          <p:style>
+            <a:lnRef idx="2">
+              <a:schemeClr val="accent1">
+                <a:shade val="50000"/>
+              </a:schemeClr>
+            </a:lnRef>
+            <a:fillRef idx="1">
+              <a:schemeClr val="accent1"/>
+            </a:fillRef>
+            <a:effectRef idx="0">
+              <a:schemeClr val="accent1"/>
+            </a:effectRef>
+            <a:fontRef idx="minor">
+              <a:schemeClr val="lt1"/>
+            </a:fontRef>
+          </p:style>
+          <p:txBody>
+            <a:bodyPr rtlCol="0" anchor="ctr"/>
+            <a:lstStyle/>
+            <a:p>
+              <a:pPr algn="ctr"/>
+              <a:r>
+                <a:rPr lang="ru-RU" dirty="0" smtClean="0"/>
+                <a:t>Адаптер </a:t>
+              </a:r>
+              <a:r>
+                <a:rPr lang="en-US" dirty="0" err="1" smtClean="0"/>
+                <a:t>mbox</a:t>
+              </a:r>
+              <a:endParaRPr lang="ru-RU" dirty="0"/>
+            </a:p>
+          </p:txBody>
+        </p:sp>
+        <p:cxnSp>
+          <p:nvCxnSpPr>
+            <p:cNvPr id="33" name="Прямая со стрелкой 32"/>
+            <p:cNvCxnSpPr>
+              <a:stCxn id="31" idx="0"/>
+              <a:endCxn id="32" idx="2"/>
+            </p:cNvCxnSpPr>
+            <p:nvPr/>
+          </p:nvCxnSpPr>
+          <p:spPr>
+            <a:xfrm rot="5400000" flipH="1" flipV="1">
+              <a:off x="2362200" y="5029200"/>
+              <a:ext cx="457200" cy="1588"/>
+            </a:xfrm>
+            <a:prstGeom prst="straightConnector1">
+              <a:avLst/>
+            </a:prstGeom>
+            <a:ln w="38100">
+              <a:tailEnd type="arrow"/>
+            </a:ln>
+            <a:effectLst/>
+          </p:spPr>
+          <p:style>
+            <a:lnRef idx="2">
+              <a:schemeClr val="accent2"/>
+            </a:lnRef>
+            <a:fillRef idx="0">
+              <a:schemeClr val="accent2"/>
+            </a:fillRef>
+            <a:effectRef idx="1">
+              <a:schemeClr val="accent2"/>
+            </a:effectRef>
+            <a:fontRef idx="minor">
+              <a:schemeClr val="tx1"/>
+            </a:fontRef>
+          </p:style>
+        </p:cxnSp>
+      </p:grpSp>
+      <p:grpSp>
+        <p:nvGrpSpPr>
+          <p:cNvPr id="34" name="Группа 33"/>
+          <p:cNvGrpSpPr/>
+          <p:nvPr/>
+        </p:nvGrpSpPr>
+        <p:grpSpPr>
+          <a:xfrm>
+            <a:off x="5257800" y="4114800"/>
+            <a:ext cx="1371600" cy="1905000"/>
+            <a:chOff x="1905000" y="4114800"/>
+            <a:chExt cx="1371600" cy="1905000"/>
+          </a:xfrm>
+        </p:grpSpPr>
+        <p:sp>
+          <p:nvSpPr>
+            <p:cNvPr id="35" name="Прямоугольник 34"/>
+            <p:cNvSpPr/>
+            <p:nvPr/>
+          </p:nvSpPr>
+          <p:spPr>
+            <a:xfrm>
+              <a:off x="1905000" y="5257800"/>
+              <a:ext cx="1371600" cy="762000"/>
+            </a:xfrm>
+            <a:prstGeom prst="rect">
+              <a:avLst/>
+            </a:prstGeom>
+            <a:solidFill>
+              <a:srgbClr val="216A97"/>
+            </a:solidFill>
+          </p:spPr>
+          <p:style>
+            <a:lnRef idx="2">
+              <a:schemeClr val="accent3">
+                <a:shade val="50000"/>
+              </a:schemeClr>
+            </a:lnRef>
+            <a:fillRef idx="1">
+              <a:schemeClr val="accent3"/>
+            </a:fillRef>
+            <a:effectRef idx="0">
+              <a:schemeClr val="accent3"/>
+            </a:effectRef>
+            <a:fontRef idx="minor">
+              <a:schemeClr val="lt1"/>
+            </a:fontRef>
+          </p:style>
+          <p:txBody>
+            <a:bodyPr rtlCol="0" anchor="ctr"/>
+            <a:lstStyle/>
+            <a:p>
+              <a:pPr algn="ctr"/>
+              <a:r>
+                <a:rPr lang="ru-RU" dirty="0" smtClean="0"/>
+                <a:t>Файл </a:t>
+              </a:r>
+              <a:r>
+                <a:rPr lang="en-US" dirty="0" smtClean="0">
+                  <a:solidFill>
+                    <a:schemeClr val="accent2">
+                      <a:lumMod val="50000"/>
+                    </a:schemeClr>
+                  </a:solidFill>
+                </a:rPr>
+                <a:t>jpg</a:t>
+              </a:r>
+              <a:endParaRPr lang="ru-RU" dirty="0">
+                <a:solidFill>
+                  <a:schemeClr val="accent2">
+                    <a:lumMod val="50000"/>
+                  </a:schemeClr>
+                </a:solidFill>
+              </a:endParaRPr>
+            </a:p>
+          </p:txBody>
+        </p:sp>
+        <p:sp>
+          <p:nvSpPr>
+            <p:cNvPr id="36" name="Скругленный прямоугольник 35"/>
+            <p:cNvSpPr/>
+            <p:nvPr/>
+          </p:nvSpPr>
+          <p:spPr>
+            <a:xfrm>
+              <a:off x="1905000" y="4114800"/>
+              <a:ext cx="1371600" cy="685800"/>
+            </a:xfrm>
+            <a:prstGeom prst="roundRect">
+              <a:avLst>
+                <a:gd name="adj" fmla="val 24748"/>
+              </a:avLst>
+            </a:prstGeom>
+          </p:spPr>
+          <p:style>
+            <a:lnRef idx="2">
+              <a:schemeClr val="accent1">
+                <a:shade val="50000"/>
+              </a:schemeClr>
+            </a:lnRef>
+            <a:fillRef idx="1">
+              <a:schemeClr val="accent1"/>
+            </a:fillRef>
+            <a:effectRef idx="0">
+              <a:schemeClr val="accent1"/>
+            </a:effectRef>
+            <a:fontRef idx="minor">
+              <a:schemeClr val="lt1"/>
+            </a:fontRef>
+          </p:style>
+          <p:txBody>
+            <a:bodyPr rtlCol="0" anchor="ctr"/>
+            <a:lstStyle/>
+            <a:p>
+              <a:pPr algn="ctr"/>
+              <a:r>
+                <a:rPr lang="ru-RU" dirty="0" smtClean="0"/>
+                <a:t>Адаптер </a:t>
+              </a:r>
+              <a:r>
+                <a:rPr lang="en-US" dirty="0" smtClean="0"/>
+                <a:t>jpg</a:t>
+              </a:r>
+              <a:endParaRPr lang="ru-RU" dirty="0"/>
+            </a:p>
+          </p:txBody>
+        </p:sp>
+        <p:cxnSp>
+          <p:nvCxnSpPr>
+            <p:cNvPr id="37" name="Прямая со стрелкой 36"/>
+            <p:cNvCxnSpPr>
+              <a:stCxn id="35" idx="0"/>
+              <a:endCxn id="36" idx="2"/>
+            </p:cNvCxnSpPr>
+            <p:nvPr/>
+          </p:nvCxnSpPr>
+          <p:spPr>
+            <a:xfrm rot="5400000" flipH="1" flipV="1">
+              <a:off x="2362200" y="5029200"/>
+              <a:ext cx="457200" cy="1588"/>
+            </a:xfrm>
+            <a:prstGeom prst="straightConnector1">
+              <a:avLst/>
+            </a:prstGeom>
+            <a:ln w="38100">
+              <a:tailEnd type="arrow"/>
+            </a:ln>
+            <a:effectLst/>
+          </p:spPr>
+          <p:style>
+            <a:lnRef idx="2">
+              <a:schemeClr val="accent2"/>
+            </a:lnRef>
+            <a:fillRef idx="0">
+              <a:schemeClr val="accent2"/>
+            </a:fillRef>
+            <a:effectRef idx="1">
+              <a:schemeClr val="accent2"/>
+            </a:effectRef>
+            <a:fontRef idx="minor">
+              <a:schemeClr val="tx1"/>
+            </a:fontRef>
+          </p:style>
+        </p:cxnSp>
+      </p:grpSp>
+      <p:sp>
+        <p:nvSpPr>
+          <p:cNvPr id="39" name="Прямоугольник 38"/>
+          <p:cNvSpPr/>
+          <p:nvPr/>
+        </p:nvSpPr>
+        <p:spPr>
+          <a:xfrm>
+            <a:off x="6934200" y="1828800"/>
+            <a:ext cx="1981200" cy="1143000"/>
+          </a:xfrm>
+          <a:prstGeom prst="rect">
+            <a:avLst/>
+          </a:prstGeom>
+          <a:ln/>
+        </p:spPr>
+        <p:style>
+          <a:lnRef idx="2">
+            <a:schemeClr val="accent4">
+              <a:shade val="50000"/>
+            </a:schemeClr>
+          </a:lnRef>
+          <a:fillRef idx="1">
+            <a:schemeClr val="accent4"/>
+          </a:fillRef>
+          <a:effectRef idx="0">
+            <a:schemeClr val="accent4"/>
+          </a:effectRef>
+          <a:fontRef idx="minor">
+            <a:schemeClr val="lt1"/>
+          </a:fontRef>
+        </p:style>
+        <p:txBody>
+          <a:bodyPr rtlCol="0" anchor="ctr"/>
+          <a:lstStyle/>
+          <a:p>
+            <a:pPr algn="ctr"/>
+            <a:r>
+              <a:rPr lang="ru-RU" dirty="0" smtClean="0"/>
+              <a:t>Визуализация семантического графа (</a:t>
+            </a:r>
+            <a:r>
+              <a:rPr lang="en-US" dirty="0" smtClean="0"/>
+              <a:t>HTML</a:t>
+            </a:r>
+            <a:r>
+              <a:rPr lang="ru-RU" dirty="0" smtClean="0"/>
+              <a:t>страница</a:t>
+            </a:r>
+            <a:r>
+              <a:rPr lang="en-US" dirty="0" smtClean="0"/>
+              <a:t>)</a:t>
+            </a:r>
+            <a:endParaRPr lang="ru-RU" dirty="0"/>
+          </a:p>
+        </p:txBody>
+      </p:sp>
+      <p:cxnSp>
+        <p:nvCxnSpPr>
+          <p:cNvPr id="41" name="Прямая со стрелкой 40"/>
+          <p:cNvCxnSpPr/>
+          <p:nvPr/>
+        </p:nvCxnSpPr>
+        <p:spPr>
+          <a:xfrm flipV="1">
+            <a:off x="1295400" y="3048000"/>
+            <a:ext cx="2438400" cy="990600"/>
+          </a:xfrm>
+          <a:prstGeom prst="straightConnector1">
+            <a:avLst/>
+          </a:prstGeom>
+          <a:ln>
+            <a:tailEnd type="arrow"/>
+          </a:ln>
+          <a:effectLst/>
+        </p:spPr>
+        <p:style>
+          <a:lnRef idx="3">
+            <a:schemeClr val="accent5"/>
+          </a:lnRef>
+          <a:fillRef idx="0">
+            <a:schemeClr val="accent5"/>
+          </a:fillRef>
+          <a:effectRef idx="2">
+            <a:schemeClr val="accent5"/>
+          </a:effectRef>
+          <a:fontRef idx="minor">
+            <a:schemeClr val="tx1"/>
+          </a:fontRef>
+        </p:style>
+      </p:cxnSp>
+      <p:cxnSp>
+        <p:nvCxnSpPr>
+          <p:cNvPr id="43" name="Прямая со стрелкой 42"/>
+          <p:cNvCxnSpPr/>
+          <p:nvPr/>
+        </p:nvCxnSpPr>
+        <p:spPr>
+          <a:xfrm flipV="1">
+            <a:off x="2895600" y="3352800"/>
+            <a:ext cx="1143000" cy="685800"/>
+          </a:xfrm>
+          <a:prstGeom prst="straightConnector1">
+            <a:avLst/>
+          </a:prstGeom>
+          <a:ln>
+            <a:tailEnd type="arrow"/>
+          </a:ln>
+          <a:effectLst/>
+        </p:spPr>
+        <p:style>
+          <a:lnRef idx="3">
+            <a:schemeClr val="accent5"/>
+          </a:lnRef>
+          <a:fillRef idx="0">
+            <a:schemeClr val="accent5"/>
+          </a:fillRef>
+          <a:effectRef idx="2">
+            <a:schemeClr val="accent5"/>
+          </a:effectRef>
+          <a:fontRef idx="minor">
+            <a:schemeClr val="tx1"/>
+          </a:fontRef>
+        </p:style>
+      </p:cxnSp>
+      <p:cxnSp>
+        <p:nvCxnSpPr>
+          <p:cNvPr id="44" name="Прямая со стрелкой 43"/>
+          <p:cNvCxnSpPr/>
+          <p:nvPr/>
+        </p:nvCxnSpPr>
+        <p:spPr>
+          <a:xfrm rot="5400000" flipH="1" flipV="1">
+            <a:off x="4191000" y="3657600"/>
+            <a:ext cx="533400" cy="228600"/>
+          </a:xfrm>
+          <a:prstGeom prst="straightConnector1">
+            <a:avLst/>
+          </a:prstGeom>
+          <a:ln>
+            <a:tailEnd type="arrow"/>
+          </a:ln>
+          <a:effectLst/>
+        </p:spPr>
+        <p:style>
+          <a:lnRef idx="3">
+            <a:schemeClr val="accent5"/>
+          </a:lnRef>
+          <a:fillRef idx="0">
+            <a:schemeClr val="accent5"/>
+          </a:fillRef>
+          <a:effectRef idx="2">
+            <a:schemeClr val="accent5"/>
+          </a:effectRef>
+          <a:fontRef idx="minor">
+            <a:schemeClr val="tx1"/>
+          </a:fontRef>
+        </p:style>
+      </p:cxnSp>
+      <p:cxnSp>
+        <p:nvCxnSpPr>
+          <p:cNvPr id="46" name="Прямая со стрелкой 45"/>
+          <p:cNvCxnSpPr/>
+          <p:nvPr/>
+        </p:nvCxnSpPr>
+        <p:spPr>
+          <a:xfrm rot="16200000" flipV="1">
+            <a:off x="5257800" y="3581400"/>
+            <a:ext cx="533400" cy="381000"/>
+          </a:xfrm>
+          <a:prstGeom prst="straightConnector1">
+            <a:avLst/>
+          </a:prstGeom>
+          <a:ln>
+            <a:tailEnd type="arrow"/>
+          </a:ln>
+          <a:effectLst/>
+        </p:spPr>
+        <p:style>
+          <a:lnRef idx="3">
+            <a:schemeClr val="accent5"/>
+          </a:lnRef>
+          <a:fillRef idx="0">
+            <a:schemeClr val="accent5"/>
+          </a:fillRef>
+          <a:effectRef idx="2">
+            <a:schemeClr val="accent5"/>
+          </a:effectRef>
+          <a:fontRef idx="minor">
+            <a:schemeClr val="tx1"/>
+          </a:fontRef>
+        </p:style>
+      </p:cxnSp>
+      <p:sp>
+        <p:nvSpPr>
+          <p:cNvPr id="62" name="Стрелка вниз 61"/>
+          <p:cNvSpPr/>
+          <p:nvPr/>
+        </p:nvSpPr>
+        <p:spPr>
+          <a:xfrm rot="16200000">
+            <a:off x="6248400" y="2133600"/>
+            <a:ext cx="381000" cy="685800"/>
+          </a:xfrm>
+          <a:prstGeom prst="downArrow">
+            <a:avLst>
+              <a:gd name="adj1" fmla="val 35454"/>
+              <a:gd name="adj2" fmla="val 69394"/>
+            </a:avLst>
+          </a:prstGeom>
+          <a:solidFill>
+            <a:srgbClr val="FF0000"/>
+          </a:solidFill>
+          <a:ln>
+            <a:noFill/>
+          </a:ln>
+        </p:spPr>
+        <p:style>
+          <a:lnRef idx="2">
+            <a:schemeClr val="accent2">
+              <a:shade val="50000"/>
+            </a:schemeClr>
+          </a:lnRef>
+          <a:fillRef idx="1">
+            <a:schemeClr val="accent2"/>
+          </a:fillRef>
+          <a:effectRef idx="0">
+            <a:schemeClr val="accent2"/>
+          </a:effectRef>
+          <a:fontRef idx="minor">
+            <a:schemeClr val="lt1"/>
+          </a:fontRef>
+        </p:style>
+        <p:txBody>
+          <a:bodyPr rtlCol="0" anchor="ctr"/>
+          <a:lstStyle/>
+          <a:p>
+            <a:pPr algn="ctr"/>
+            <a:endParaRPr lang="ru-RU"/>
+          </a:p>
+        </p:txBody>
+      </p:sp>
+      <p:grpSp>
+        <p:nvGrpSpPr>
+          <p:cNvPr id="64" name="Группа 63"/>
+          <p:cNvGrpSpPr/>
+          <p:nvPr/>
+        </p:nvGrpSpPr>
+        <p:grpSpPr>
+          <a:xfrm>
+            <a:off x="7620000" y="4114800"/>
+            <a:ext cx="1371600" cy="1905000"/>
+            <a:chOff x="1905000" y="4114800"/>
+            <a:chExt cx="1371600" cy="1905000"/>
+          </a:xfrm>
+        </p:grpSpPr>
+        <p:sp>
+          <p:nvSpPr>
+            <p:cNvPr id="65" name="Прямоугольник 64"/>
+            <p:cNvSpPr/>
+            <p:nvPr/>
+          </p:nvSpPr>
+          <p:spPr>
+            <a:xfrm>
+              <a:off x="1905000" y="5257800"/>
+              <a:ext cx="1371600" cy="762000"/>
+            </a:xfrm>
+            <a:prstGeom prst="rect">
+              <a:avLst/>
+            </a:prstGeom>
+            <a:solidFill>
+              <a:srgbClr val="216A97"/>
+            </a:solidFill>
+          </p:spPr>
+          <p:style>
+            <a:lnRef idx="2">
+              <a:schemeClr val="accent3">
+                <a:shade val="50000"/>
+              </a:schemeClr>
+            </a:lnRef>
+            <a:fillRef idx="1">
+              <a:schemeClr val="accent3"/>
+            </a:fillRef>
+            <a:effectRef idx="0">
+              <a:schemeClr val="accent3"/>
+            </a:effectRef>
+            <a:fontRef idx="minor">
+              <a:schemeClr val="lt1"/>
+            </a:fontRef>
+          </p:style>
+          <p:txBody>
+            <a:bodyPr rtlCol="0" anchor="ctr"/>
+            <a:lstStyle/>
+            <a:p>
+              <a:pPr algn="ctr"/>
+              <a:r>
+                <a:rPr lang="ru-RU" dirty="0" smtClean="0"/>
+                <a:t>Файл</a:t>
+              </a:r>
+              <a:endParaRPr lang="ru-RU" dirty="0">
+                <a:solidFill>
+                  <a:schemeClr val="accent2">
+                    <a:lumMod val="50000"/>
+                  </a:schemeClr>
+                </a:solidFill>
+              </a:endParaRPr>
+            </a:p>
+          </p:txBody>
+        </p:sp>
+        <p:sp>
+          <p:nvSpPr>
+            <p:cNvPr id="66" name="Скругленный прямоугольник 65"/>
+            <p:cNvSpPr/>
+            <p:nvPr/>
+          </p:nvSpPr>
+          <p:spPr>
+            <a:xfrm>
+              <a:off x="1905000" y="4114800"/>
+              <a:ext cx="1371600" cy="685800"/>
+            </a:xfrm>
+            <a:prstGeom prst="roundRect">
+              <a:avLst>
+                <a:gd name="adj" fmla="val 24748"/>
+              </a:avLst>
+            </a:prstGeom>
+          </p:spPr>
+          <p:style>
+            <a:lnRef idx="2">
+              <a:schemeClr val="accent1">
+                <a:shade val="50000"/>
+              </a:schemeClr>
+            </a:lnRef>
+            <a:fillRef idx="1">
+              <a:schemeClr val="accent1"/>
+            </a:fillRef>
+            <a:effectRef idx="0">
+              <a:schemeClr val="accent1"/>
+            </a:effectRef>
+            <a:fontRef idx="minor">
+              <a:schemeClr val="lt1"/>
+            </a:fontRef>
+          </p:style>
+          <p:txBody>
+            <a:bodyPr rtlCol="0" anchor="ctr"/>
+            <a:lstStyle/>
+            <a:p>
+              <a:pPr algn="ctr"/>
+              <a:r>
+                <a:rPr lang="ru-RU" dirty="0" smtClean="0"/>
+                <a:t>Адаптер</a:t>
+              </a:r>
+              <a:endParaRPr lang="ru-RU" dirty="0"/>
+            </a:p>
+          </p:txBody>
+        </p:sp>
+        <p:cxnSp>
+          <p:nvCxnSpPr>
+            <p:cNvPr id="67" name="Прямая со стрелкой 66"/>
+            <p:cNvCxnSpPr>
+              <a:stCxn id="65" idx="0"/>
+              <a:endCxn id="66" idx="2"/>
+            </p:cNvCxnSpPr>
+            <p:nvPr/>
+          </p:nvCxnSpPr>
+          <p:spPr>
+            <a:xfrm rot="5400000" flipH="1" flipV="1">
+              <a:off x="2362200" y="5029200"/>
+              <a:ext cx="457200" cy="1588"/>
+            </a:xfrm>
+            <a:prstGeom prst="straightConnector1">
+              <a:avLst/>
+            </a:prstGeom>
+            <a:ln w="38100">
+              <a:tailEnd type="arrow"/>
+            </a:ln>
+            <a:effectLst/>
+          </p:spPr>
+          <p:style>
+            <a:lnRef idx="2">
+              <a:schemeClr val="accent2"/>
+            </a:lnRef>
+            <a:fillRef idx="0">
+              <a:schemeClr val="accent2"/>
+            </a:fillRef>
+            <a:effectRef idx="1">
+              <a:schemeClr val="accent2"/>
+            </a:effectRef>
+            <a:fontRef idx="minor">
+              <a:schemeClr val="tx1"/>
+            </a:fontRef>
+          </p:style>
+        </p:cxnSp>
+      </p:grpSp>
+      <p:cxnSp>
+        <p:nvCxnSpPr>
+          <p:cNvPr id="68" name="Прямая со стрелкой 67"/>
+          <p:cNvCxnSpPr/>
+          <p:nvPr/>
+        </p:nvCxnSpPr>
+        <p:spPr>
+          <a:xfrm rot="10800000">
+            <a:off x="5791200" y="3124200"/>
+            <a:ext cx="1905000" cy="914400"/>
+          </a:xfrm>
+          <a:prstGeom prst="straightConnector1">
+            <a:avLst/>
+          </a:prstGeom>
+          <a:ln>
+            <a:tailEnd type="arrow"/>
+          </a:ln>
+          <a:effectLst/>
+        </p:spPr>
+        <p:style>
+          <a:lnRef idx="3">
+            <a:schemeClr val="accent5"/>
+          </a:lnRef>
+          <a:fillRef idx="0">
+            <a:schemeClr val="accent5"/>
+          </a:fillRef>
+          <a:effectRef idx="2">
+            <a:schemeClr val="accent5"/>
+          </a:effectRef>
+          <a:fontRef idx="minor">
+            <a:schemeClr val="tx1"/>
+          </a:fontRef>
+        </p:style>
+      </p:cxnSp>
     </p:spTree>
   </p:cSld>
   <p:clrMapOvr>

</xml_diff>